<commit_message>
Speed Pin identified and PWM running with 16kHz
</commit_message>
<xml_diff>
--- a/documentation/BANFANGHUB Pinout.pptx
+++ b/documentation/BANFANGHUB Pinout.pptx
@@ -3755,8 +3755,8 @@
         </p:nvSpPr>
         <p:spPr>
           <a:xfrm rot="16200000">
-            <a:off x="3931219" y="478110"/>
-            <a:ext cx="999954" cy="276999"/>
+            <a:off x="3893581" y="478110"/>
+            <a:ext cx="1075231" cy="276999"/>
           </a:xfrm>
           <a:prstGeom prst="rect">
             <a:avLst/>
@@ -3771,7 +3771,7 @@
           <a:p>
             <a:r>
               <a:rPr lang="de-DE" sz="1200" dirty="0" err="1" smtClean="0"/>
-              <a:t>Battry</a:t>
+              <a:t>Battery</a:t>
             </a:r>
             <a:r>
               <a:rPr lang="de-DE" sz="1200" dirty="0" smtClean="0"/>
@@ -3793,7 +3793,7 @@
         </p:nvSpPr>
         <p:spPr>
           <a:xfrm rot="16200000">
-            <a:off x="3698413" y="469628"/>
+            <a:off x="3698413" y="516521"/>
             <a:ext cx="1033232" cy="276999"/>
           </a:xfrm>
           <a:prstGeom prst="rect">
@@ -3814,6 +3814,36 @@
             <a:r>
               <a:rPr lang="de-DE" sz="1200" dirty="0" err="1" smtClean="0"/>
               <a:t>switch</a:t>
+            </a:r>
+            <a:endParaRPr lang="de-DE" sz="1200" dirty="0"/>
+          </a:p>
+        </p:txBody>
+      </p:sp>
+      <p:sp>
+        <p:nvSpPr>
+          <p:cNvPr id="48" name="Textfeld 47"/>
+          <p:cNvSpPr txBox="1"/>
+          <p:nvPr/>
+        </p:nvSpPr>
+        <p:spPr>
+          <a:xfrm rot="16200000">
+            <a:off x="4569822" y="5735435"/>
+            <a:ext cx="569387" cy="276999"/>
+          </a:xfrm>
+          <a:prstGeom prst="rect">
+            <a:avLst/>
+          </a:prstGeom>
+          <a:noFill/>
+        </p:spPr>
+        <p:txBody>
+          <a:bodyPr wrap="none" rtlCol="0">
+            <a:spAutoFit/>
+          </a:bodyPr>
+          <a:lstStyle/>
+          <a:p>
+            <a:r>
+              <a:rPr lang="de-DE" sz="1200" dirty="0" smtClean="0"/>
+              <a:t>Speed</a:t>
             </a:r>
             <a:endParaRPr lang="de-DE" sz="1200" dirty="0"/>
           </a:p>

</xml_diff>

<commit_message>
Identified throttle and brake pins
</commit_message>
<xml_diff>
--- a/documentation/BANFANGHUB Pinout.pptx
+++ b/documentation/BANFANGHUB Pinout.pptx
@@ -3711,14 +3711,14 @@
       </p:sp>
       <p:sp>
         <p:nvSpPr>
-          <p:cNvPr id="35" name="Textfeld 34"/>
+          <p:cNvPr id="46" name="Textfeld 45"/>
           <p:cNvSpPr txBox="1"/>
           <p:nvPr/>
         </p:nvSpPr>
         <p:spPr>
-          <a:xfrm>
-            <a:off x="6979556" y="3348594"/>
-            <a:ext cx="319318" cy="276999"/>
+          <a:xfrm rot="16200000">
+            <a:off x="3893581" y="478110"/>
+            <a:ext cx="1075231" cy="276999"/>
           </a:xfrm>
           <a:prstGeom prst="rect">
             <a:avLst/>
@@ -3732,31 +3732,31 @@
           <a:lstStyle/>
           <a:p>
             <a:r>
-              <a:rPr lang="de-DE" sz="1200" dirty="0" smtClean="0">
-                <a:solidFill>
-                  <a:srgbClr val="FF0000"/>
-                </a:solidFill>
-              </a:rPr>
-              <a:t>xx</a:t>
-            </a:r>
-            <a:endParaRPr lang="de-DE" sz="1200" dirty="0">
-              <a:solidFill>
-                <a:srgbClr val="FF0000"/>
-              </a:solidFill>
-            </a:endParaRPr>
-          </a:p>
-        </p:txBody>
-      </p:sp>
-      <p:sp>
-        <p:nvSpPr>
-          <p:cNvPr id="46" name="Textfeld 45"/>
+              <a:rPr lang="de-DE" sz="1200" dirty="0" err="1" smtClean="0"/>
+              <a:t>Battery</a:t>
+            </a:r>
+            <a:r>
+              <a:rPr lang="de-DE" sz="1200" dirty="0" smtClean="0"/>
+              <a:t> </a:t>
+            </a:r>
+            <a:r>
+              <a:rPr lang="de-DE" sz="1200" dirty="0" err="1" smtClean="0"/>
+              <a:t>switch</a:t>
+            </a:r>
+            <a:endParaRPr lang="de-DE" sz="1200" dirty="0"/>
+          </a:p>
+        </p:txBody>
+      </p:sp>
+      <p:sp>
+        <p:nvSpPr>
+          <p:cNvPr id="47" name="Textfeld 46"/>
           <p:cNvSpPr txBox="1"/>
           <p:nvPr/>
         </p:nvSpPr>
         <p:spPr>
           <a:xfrm rot="16200000">
-            <a:off x="3893581" y="478110"/>
-            <a:ext cx="1075231" cy="276999"/>
+            <a:off x="3698413" y="516521"/>
+            <a:ext cx="1033232" cy="276999"/>
           </a:xfrm>
           <a:prstGeom prst="rect">
             <a:avLst/>
@@ -3770,12 +3770,8 @@
           <a:lstStyle/>
           <a:p>
             <a:r>
-              <a:rPr lang="de-DE" sz="1200" dirty="0" err="1" smtClean="0"/>
-              <a:t>Battery</a:t>
-            </a:r>
-            <a:r>
               <a:rPr lang="de-DE" sz="1200" dirty="0" smtClean="0"/>
-              <a:t> </a:t>
+              <a:t>DC/DC </a:t>
             </a:r>
             <a:r>
               <a:rPr lang="de-DE" sz="1200" dirty="0" err="1" smtClean="0"/>
@@ -3787,14 +3783,14 @@
       </p:sp>
       <p:sp>
         <p:nvSpPr>
-          <p:cNvPr id="47" name="Textfeld 46"/>
+          <p:cNvPr id="48" name="Textfeld 47"/>
           <p:cNvSpPr txBox="1"/>
           <p:nvPr/>
         </p:nvSpPr>
         <p:spPr>
           <a:xfrm rot="16200000">
-            <a:off x="3698413" y="516521"/>
-            <a:ext cx="1033232" cy="276999"/>
+            <a:off x="4569822" y="5735435"/>
+            <a:ext cx="569387" cy="276999"/>
           </a:xfrm>
           <a:prstGeom prst="rect">
             <a:avLst/>
@@ -3809,11 +3805,7 @@
           <a:p>
             <a:r>
               <a:rPr lang="de-DE" sz="1200" dirty="0" smtClean="0"/>
-              <a:t>DC/DC </a:t>
-            </a:r>
-            <a:r>
-              <a:rPr lang="de-DE" sz="1200" dirty="0" err="1" smtClean="0"/>
-              <a:t>switch</a:t>
+              <a:t>Speed</a:t>
             </a:r>
             <a:endParaRPr lang="de-DE" sz="1200" dirty="0"/>
           </a:p>
@@ -3821,14 +3813,14 @@
       </p:sp>
       <p:sp>
         <p:nvSpPr>
-          <p:cNvPr id="48" name="Textfeld 47"/>
+          <p:cNvPr id="25" name="Textfeld 24"/>
           <p:cNvSpPr txBox="1"/>
           <p:nvPr/>
         </p:nvSpPr>
         <p:spPr>
-          <a:xfrm rot="16200000">
-            <a:off x="4569822" y="5735435"/>
-            <a:ext cx="569387" cy="276999"/>
+          <a:xfrm>
+            <a:off x="721657" y="4325754"/>
+            <a:ext cx="1540871" cy="276999"/>
           </a:xfrm>
           <a:prstGeom prst="rect">
             <a:avLst/>
@@ -3843,7 +3835,19 @@
           <a:p>
             <a:r>
               <a:rPr lang="de-DE" sz="1200" dirty="0" smtClean="0"/>
-              <a:t>Speed</a:t>
+              <a:t>ADC (</a:t>
+            </a:r>
+            <a:r>
+              <a:rPr lang="de-DE" sz="1200" dirty="0" err="1" smtClean="0"/>
+              <a:t>Battery</a:t>
+            </a:r>
+            <a:r>
+              <a:rPr lang="de-DE" sz="1200" dirty="0" smtClean="0"/>
+              <a:t>) </a:t>
+            </a:r>
+            <a:r>
+              <a:rPr lang="de-DE" sz="1200" dirty="0" err="1" smtClean="0"/>
+              <a:t>Current</a:t>
             </a:r>
             <a:endParaRPr lang="de-DE" sz="1200" dirty="0"/>
           </a:p>
@@ -3851,14 +3855,14 @@
       </p:sp>
       <p:sp>
         <p:nvSpPr>
-          <p:cNvPr id="25" name="Textfeld 24"/>
+          <p:cNvPr id="26" name="Textfeld 25"/>
           <p:cNvSpPr txBox="1"/>
           <p:nvPr/>
         </p:nvSpPr>
         <p:spPr>
-          <a:xfrm>
-            <a:off x="721657" y="4325754"/>
-            <a:ext cx="1611403" cy="276999"/>
+          <a:xfrm rot="16200000">
+            <a:off x="3574797" y="5976547"/>
+            <a:ext cx="986296" cy="276999"/>
           </a:xfrm>
           <a:prstGeom prst="rect">
             <a:avLst/>
@@ -3873,19 +3877,11 @@
           <a:p>
             <a:r>
               <a:rPr lang="de-DE" sz="1200" dirty="0" smtClean="0"/>
-              <a:t>ADC (</a:t>
+              <a:t>ADC </a:t>
             </a:r>
             <a:r>
               <a:rPr lang="de-DE" sz="1200" dirty="0" err="1" smtClean="0"/>
-              <a:t>Battery</a:t>
-            </a:r>
-            <a:r>
-              <a:rPr lang="de-DE" sz="1200" dirty="0" smtClean="0"/>
-              <a:t>?) </a:t>
-            </a:r>
-            <a:r>
-              <a:rPr lang="de-DE" sz="1200" dirty="0" err="1" smtClean="0"/>
-              <a:t>Current</a:t>
+              <a:t>Throttle</a:t>
             </a:r>
             <a:endParaRPr lang="de-DE" sz="1200" dirty="0"/>
           </a:p>
@@ -3893,14 +3889,14 @@
       </p:sp>
       <p:sp>
         <p:nvSpPr>
-          <p:cNvPr id="26" name="Textfeld 25"/>
+          <p:cNvPr id="27" name="Textfeld 26"/>
           <p:cNvSpPr txBox="1"/>
           <p:nvPr/>
         </p:nvSpPr>
         <p:spPr>
-          <a:xfrm rot="16200000">
-            <a:off x="3514685" y="6004002"/>
-            <a:ext cx="1106521" cy="276999"/>
+          <a:xfrm>
+            <a:off x="827584" y="3726161"/>
+            <a:ext cx="1430776" cy="276999"/>
           </a:xfrm>
           <a:prstGeom prst="rect">
             <a:avLst/>
@@ -3919,11 +3915,15 @@
             </a:r>
             <a:r>
               <a:rPr lang="de-DE" sz="1200" dirty="0" err="1" smtClean="0"/>
-              <a:t>Throttle</a:t>
+              <a:t>Battery</a:t>
             </a:r>
             <a:r>
               <a:rPr lang="de-DE" sz="1200" dirty="0" smtClean="0"/>
-              <a:t>?!</a:t>
+              <a:t> </a:t>
+            </a:r>
+            <a:r>
+              <a:rPr lang="de-DE" sz="1200" dirty="0" err="1" smtClean="0"/>
+              <a:t>voltage</a:t>
             </a:r>
             <a:endParaRPr lang="de-DE" sz="1200" dirty="0"/>
           </a:p>
@@ -3931,14 +3931,14 @@
       </p:sp>
       <p:sp>
         <p:nvSpPr>
-          <p:cNvPr id="27" name="Textfeld 26"/>
+          <p:cNvPr id="28" name="Textfeld 27"/>
           <p:cNvSpPr txBox="1"/>
           <p:nvPr/>
         </p:nvSpPr>
         <p:spPr>
-          <a:xfrm>
-            <a:off x="827584" y="3726161"/>
-            <a:ext cx="1483676" cy="276999"/>
+          <a:xfrm rot="16200000">
+            <a:off x="2521231" y="6229657"/>
+            <a:ext cx="2218300" cy="276999"/>
           </a:xfrm>
           <a:prstGeom prst="rect">
             <a:avLst/>
@@ -3966,6 +3966,52 @@
             <a:r>
               <a:rPr lang="de-DE" sz="1200" dirty="0" err="1" smtClean="0"/>
               <a:t>voltage</a:t>
+            </a:r>
+            <a:r>
+              <a:rPr lang="de-DE" sz="1200" dirty="0" smtClean="0"/>
+              <a:t> </a:t>
+            </a:r>
+            <a:r>
+              <a:rPr lang="de-DE" sz="1200" dirty="0" err="1" smtClean="0"/>
+              <a:t>with</a:t>
+            </a:r>
+            <a:r>
+              <a:rPr lang="de-DE" sz="1200" dirty="0" smtClean="0"/>
+              <a:t> </a:t>
+            </a:r>
+            <a:r>
+              <a:rPr lang="de-DE" sz="1200" dirty="0" err="1" smtClean="0"/>
+              <a:t>offset</a:t>
+            </a:r>
+            <a:endParaRPr lang="de-DE" sz="1200" dirty="0"/>
+          </a:p>
+        </p:txBody>
+      </p:sp>
+      <p:sp>
+        <p:nvSpPr>
+          <p:cNvPr id="30" name="Textfeld 29"/>
+          <p:cNvSpPr txBox="1"/>
+          <p:nvPr/>
+        </p:nvSpPr>
+        <p:spPr>
+          <a:xfrm>
+            <a:off x="1690143" y="1938604"/>
+            <a:ext cx="534057" cy="276999"/>
+          </a:xfrm>
+          <a:prstGeom prst="rect">
+            <a:avLst/>
+          </a:prstGeom>
+          <a:noFill/>
+        </p:spPr>
+        <p:txBody>
+          <a:bodyPr wrap="none" rtlCol="0">
+            <a:spAutoFit/>
+          </a:bodyPr>
+          <a:lstStyle/>
+          <a:p>
+            <a:r>
+              <a:rPr lang="de-DE" sz="1200" dirty="0" smtClean="0"/>
+              <a:t>Brake</a:t>
             </a:r>
             <a:endParaRPr lang="de-DE" sz="1200" dirty="0"/>
           </a:p>

</xml_diff>

<commit_message>
torquesensor green wire pin
</commit_message>
<xml_diff>
--- a/documentation/BANFANGHUB Pinout.pptx
+++ b/documentation/BANFANGHUB Pinout.pptx
@@ -4017,6 +4017,44 @@
           </a:p>
         </p:txBody>
       </p:sp>
+      <p:sp>
+        <p:nvSpPr>
+          <p:cNvPr id="31" name="Textfeld 30"/>
+          <p:cNvSpPr txBox="1"/>
+          <p:nvPr/>
+        </p:nvSpPr>
+        <p:spPr>
+          <a:xfrm rot="16200000">
+            <a:off x="5352616" y="478109"/>
+            <a:ext cx="1020023" cy="276999"/>
+          </a:xfrm>
+          <a:prstGeom prst="rect">
+            <a:avLst/>
+          </a:prstGeom>
+          <a:noFill/>
+        </p:spPr>
+        <p:txBody>
+          <a:bodyPr wrap="none" rtlCol="0">
+            <a:spAutoFit/>
+          </a:bodyPr>
+          <a:lstStyle/>
+          <a:p>
+            <a:r>
+              <a:rPr lang="de-DE" sz="1200" dirty="0" smtClean="0"/>
+              <a:t>PAS (</a:t>
+            </a:r>
+            <a:r>
+              <a:rPr lang="de-DE" sz="1200" dirty="0" err="1" smtClean="0"/>
+              <a:t>green</a:t>
+            </a:r>
+            <a:r>
+              <a:rPr lang="de-DE" sz="1200" dirty="0" smtClean="0"/>
+              <a:t>?!)</a:t>
+            </a:r>
+            <a:endParaRPr lang="de-DE" sz="1200" dirty="0"/>
+          </a:p>
+        </p:txBody>
+      </p:sp>
     </p:spTree>
     <p:extLst>
       <p:ext uri="{BB962C8B-B14F-4D97-AF65-F5344CB8AC3E}">

</xml_diff>

<commit_message>
PWM signal from encoder read in
</commit_message>
<xml_diff>
--- a/documentation/BANFANGHUB Pinout.pptx
+++ b/documentation/BANFANGHUB Pinout.pptx
@@ -288,7 +288,7 @@
           <a:p>
             <a:fld id="{35FD3595-6B9E-46C3-8029-CE7D28936448}" type="datetimeFigureOut">
               <a:rPr lang="de-DE" smtClean="0"/>
-              <a:t>28.09.2025</a:t>
+              <a:t>11.10.2025</a:t>
             </a:fld>
             <a:endParaRPr lang="de-DE"/>
           </a:p>
@@ -458,7 +458,7 @@
           <a:p>
             <a:fld id="{35FD3595-6B9E-46C3-8029-CE7D28936448}" type="datetimeFigureOut">
               <a:rPr lang="de-DE" smtClean="0"/>
-              <a:t>28.09.2025</a:t>
+              <a:t>11.10.2025</a:t>
             </a:fld>
             <a:endParaRPr lang="de-DE"/>
           </a:p>
@@ -638,7 +638,7 @@
           <a:p>
             <a:fld id="{35FD3595-6B9E-46C3-8029-CE7D28936448}" type="datetimeFigureOut">
               <a:rPr lang="de-DE" smtClean="0"/>
-              <a:t>28.09.2025</a:t>
+              <a:t>11.10.2025</a:t>
             </a:fld>
             <a:endParaRPr lang="de-DE"/>
           </a:p>
@@ -808,7 +808,7 @@
           <a:p>
             <a:fld id="{35FD3595-6B9E-46C3-8029-CE7D28936448}" type="datetimeFigureOut">
               <a:rPr lang="de-DE" smtClean="0"/>
-              <a:t>28.09.2025</a:t>
+              <a:t>11.10.2025</a:t>
             </a:fld>
             <a:endParaRPr lang="de-DE"/>
           </a:p>
@@ -1054,7 +1054,7 @@
           <a:p>
             <a:fld id="{35FD3595-6B9E-46C3-8029-CE7D28936448}" type="datetimeFigureOut">
               <a:rPr lang="de-DE" smtClean="0"/>
-              <a:t>28.09.2025</a:t>
+              <a:t>11.10.2025</a:t>
             </a:fld>
             <a:endParaRPr lang="de-DE"/>
           </a:p>
@@ -1342,7 +1342,7 @@
           <a:p>
             <a:fld id="{35FD3595-6B9E-46C3-8029-CE7D28936448}" type="datetimeFigureOut">
               <a:rPr lang="de-DE" smtClean="0"/>
-              <a:t>28.09.2025</a:t>
+              <a:t>11.10.2025</a:t>
             </a:fld>
             <a:endParaRPr lang="de-DE"/>
           </a:p>
@@ -1764,7 +1764,7 @@
           <a:p>
             <a:fld id="{35FD3595-6B9E-46C3-8029-CE7D28936448}" type="datetimeFigureOut">
               <a:rPr lang="de-DE" smtClean="0"/>
-              <a:t>28.09.2025</a:t>
+              <a:t>11.10.2025</a:t>
             </a:fld>
             <a:endParaRPr lang="de-DE"/>
           </a:p>
@@ -1882,7 +1882,7 @@
           <a:p>
             <a:fld id="{35FD3595-6B9E-46C3-8029-CE7D28936448}" type="datetimeFigureOut">
               <a:rPr lang="de-DE" smtClean="0"/>
-              <a:t>28.09.2025</a:t>
+              <a:t>11.10.2025</a:t>
             </a:fld>
             <a:endParaRPr lang="de-DE"/>
           </a:p>
@@ -1977,7 +1977,7 @@
           <a:p>
             <a:fld id="{35FD3595-6B9E-46C3-8029-CE7D28936448}" type="datetimeFigureOut">
               <a:rPr lang="de-DE" smtClean="0"/>
-              <a:t>28.09.2025</a:t>
+              <a:t>11.10.2025</a:t>
             </a:fld>
             <a:endParaRPr lang="de-DE"/>
           </a:p>
@@ -2254,7 +2254,7 @@
           <a:p>
             <a:fld id="{35FD3595-6B9E-46C3-8029-CE7D28936448}" type="datetimeFigureOut">
               <a:rPr lang="de-DE" smtClean="0"/>
-              <a:t>28.09.2025</a:t>
+              <a:t>11.10.2025</a:t>
             </a:fld>
             <a:endParaRPr lang="de-DE"/>
           </a:p>
@@ -2507,7 +2507,7 @@
           <a:p>
             <a:fld id="{35FD3595-6B9E-46C3-8029-CE7D28936448}" type="datetimeFigureOut">
               <a:rPr lang="de-DE" smtClean="0"/>
-              <a:t>28.09.2025</a:t>
+              <a:t>11.10.2025</a:t>
             </a:fld>
             <a:endParaRPr lang="de-DE"/>
           </a:p>
@@ -2720,7 +2720,7 @@
           <a:p>
             <a:fld id="{35FD3595-6B9E-46C3-8029-CE7D28936448}" type="datetimeFigureOut">
               <a:rPr lang="de-DE" smtClean="0"/>
-              <a:t>28.09.2025</a:t>
+              <a:t>11.10.2025</a:t>
             </a:fld>
             <a:endParaRPr lang="de-DE"/>
           </a:p>
@@ -3157,7 +3157,7 @@
         </p:nvSpPr>
         <p:spPr>
           <a:xfrm>
-            <a:off x="6895398" y="2161780"/>
+            <a:off x="6849637" y="2161780"/>
             <a:ext cx="420308" cy="276999"/>
           </a:xfrm>
           <a:prstGeom prst="rect">
@@ -3217,7 +3217,7 @@
         </p:nvSpPr>
         <p:spPr>
           <a:xfrm>
-            <a:off x="6854444" y="2552870"/>
+            <a:off x="6849637" y="2552870"/>
             <a:ext cx="641522" cy="276999"/>
           </a:xfrm>
           <a:prstGeom prst="rect">
@@ -3289,7 +3289,7 @@
         </p:nvSpPr>
         <p:spPr>
           <a:xfrm>
-            <a:off x="6854444" y="4725144"/>
+            <a:off x="6849637" y="4725144"/>
             <a:ext cx="963725" cy="276999"/>
           </a:xfrm>
           <a:prstGeom prst="rect">
@@ -3409,7 +3409,7 @@
         </p:nvSpPr>
         <p:spPr>
           <a:xfrm>
-            <a:off x="6854682" y="3119343"/>
+            <a:off x="6849637" y="3119343"/>
             <a:ext cx="954107" cy="276999"/>
           </a:xfrm>
           <a:prstGeom prst="rect">
@@ -3439,7 +3439,7 @@
         </p:nvSpPr>
         <p:spPr>
           <a:xfrm>
-            <a:off x="6854682" y="2924944"/>
+            <a:off x="6849637" y="2924944"/>
             <a:ext cx="918841" cy="276999"/>
           </a:xfrm>
           <a:prstGeom prst="rect">
@@ -3469,7 +3469,7 @@
         </p:nvSpPr>
         <p:spPr>
           <a:xfrm>
-            <a:off x="6854682" y="2745629"/>
+            <a:off x="6849637" y="2745629"/>
             <a:ext cx="918841" cy="276999"/>
           </a:xfrm>
           <a:prstGeom prst="rect">
@@ -3537,7 +3537,7 @@
         </p:nvSpPr>
         <p:spPr>
           <a:xfrm>
-            <a:off x="1763688" y="2149014"/>
+            <a:off x="1879104" y="2149014"/>
             <a:ext cx="418704" cy="276999"/>
           </a:xfrm>
           <a:prstGeom prst="rect">
@@ -3597,7 +3597,7 @@
         </p:nvSpPr>
         <p:spPr>
           <a:xfrm>
-            <a:off x="1648271" y="2552284"/>
+            <a:off x="1739642" y="2552284"/>
             <a:ext cx="558166" cy="276999"/>
           </a:xfrm>
           <a:prstGeom prst="rect">
@@ -3627,8 +3627,8 @@
         </p:nvSpPr>
         <p:spPr>
           <a:xfrm>
-            <a:off x="6939075" y="3953151"/>
-            <a:ext cx="550151" cy="276999"/>
+            <a:off x="6849637" y="3953151"/>
+            <a:ext cx="821379" cy="276999"/>
           </a:xfrm>
           <a:prstGeom prst="rect">
             <a:avLst/>
@@ -3643,7 +3643,11 @@
           <a:p>
             <a:r>
               <a:rPr lang="de-DE" sz="1200" dirty="0" smtClean="0"/>
-              <a:t>Hall A</a:t>
+              <a:t>Encoder </a:t>
+            </a:r>
+            <a:r>
+              <a:rPr lang="de-DE" sz="1200" dirty="0" smtClean="0"/>
+              <a:t>A</a:t>
             </a:r>
             <a:endParaRPr lang="de-DE" sz="1200" dirty="0"/>
           </a:p>
@@ -3651,14 +3655,14 @@
       </p:sp>
       <p:sp>
         <p:nvSpPr>
-          <p:cNvPr id="21" name="Textfeld 20"/>
+          <p:cNvPr id="22" name="Textfeld 21"/>
           <p:cNvSpPr txBox="1"/>
           <p:nvPr/>
         </p:nvSpPr>
         <p:spPr>
           <a:xfrm>
-            <a:off x="6926261" y="3537652"/>
-            <a:ext cx="542136" cy="276999"/>
+            <a:off x="6849637" y="3728065"/>
+            <a:ext cx="1064151" cy="276999"/>
           </a:xfrm>
           <a:prstGeom prst="rect">
             <a:avLst/>
@@ -3666,14 +3670,18 @@
           <a:noFill/>
         </p:spPr>
         <p:txBody>
-          <a:bodyPr wrap="none" rtlCol="0">
+          <a:bodyPr wrap="square" rtlCol="0">
             <a:spAutoFit/>
           </a:bodyPr>
           <a:lstStyle/>
           <a:p>
             <a:r>
               <a:rPr lang="de-DE" sz="1200" dirty="0" smtClean="0"/>
-              <a:t>Hall C</a:t>
+              <a:t>Encoder </a:t>
+            </a:r>
+            <a:r>
+              <a:rPr lang="de-DE" sz="1200" dirty="0" smtClean="0"/>
+              <a:t>B</a:t>
             </a:r>
             <a:endParaRPr lang="de-DE" sz="1200" dirty="0"/>
           </a:p>
@@ -3681,14 +3689,14 @@
       </p:sp>
       <p:sp>
         <p:nvSpPr>
-          <p:cNvPr id="22" name="Textfeld 21"/>
+          <p:cNvPr id="46" name="Textfeld 45"/>
           <p:cNvSpPr txBox="1"/>
           <p:nvPr/>
         </p:nvSpPr>
         <p:spPr>
-          <a:xfrm>
-            <a:off x="6941572" y="3728065"/>
-            <a:ext cx="723651" cy="276999"/>
+          <a:xfrm rot="16200000">
+            <a:off x="3893581" y="478110"/>
+            <a:ext cx="1075231" cy="276999"/>
           </a:xfrm>
           <a:prstGeom prst="rect">
             <a:avLst/>
@@ -3696,14 +3704,22 @@
           <a:noFill/>
         </p:spPr>
         <p:txBody>
-          <a:bodyPr wrap="square" rtlCol="0">
+          <a:bodyPr wrap="none" rtlCol="0">
             <a:spAutoFit/>
           </a:bodyPr>
           <a:lstStyle/>
           <a:p>
             <a:r>
+              <a:rPr lang="de-DE" sz="1200" dirty="0" err="1" smtClean="0"/>
+              <a:t>Battery</a:t>
+            </a:r>
+            <a:r>
               <a:rPr lang="de-DE" sz="1200" dirty="0" smtClean="0"/>
-              <a:t>Hall B</a:t>
+              <a:t> </a:t>
+            </a:r>
+            <a:r>
+              <a:rPr lang="de-DE" sz="1200" dirty="0" err="1" smtClean="0"/>
+              <a:t>switch</a:t>
             </a:r>
             <a:endParaRPr lang="de-DE" sz="1200" dirty="0"/>
           </a:p>
@@ -3711,14 +3727,14 @@
       </p:sp>
       <p:sp>
         <p:nvSpPr>
-          <p:cNvPr id="46" name="Textfeld 45"/>
+          <p:cNvPr id="47" name="Textfeld 46"/>
           <p:cNvSpPr txBox="1"/>
           <p:nvPr/>
         </p:nvSpPr>
         <p:spPr>
           <a:xfrm rot="16200000">
-            <a:off x="3893581" y="478110"/>
-            <a:ext cx="1075231" cy="276999"/>
+            <a:off x="3698413" y="516521"/>
+            <a:ext cx="1033232" cy="276999"/>
           </a:xfrm>
           <a:prstGeom prst="rect">
             <a:avLst/>
@@ -3732,12 +3748,8 @@
           <a:lstStyle/>
           <a:p>
             <a:r>
-              <a:rPr lang="de-DE" sz="1200" dirty="0" err="1" smtClean="0"/>
-              <a:t>Battery</a:t>
-            </a:r>
-            <a:r>
               <a:rPr lang="de-DE" sz="1200" dirty="0" smtClean="0"/>
-              <a:t> </a:t>
+              <a:t>DC/DC </a:t>
             </a:r>
             <a:r>
               <a:rPr lang="de-DE" sz="1200" dirty="0" err="1" smtClean="0"/>
@@ -3749,14 +3761,14 @@
       </p:sp>
       <p:sp>
         <p:nvSpPr>
-          <p:cNvPr id="47" name="Textfeld 46"/>
+          <p:cNvPr id="48" name="Textfeld 47"/>
           <p:cNvSpPr txBox="1"/>
           <p:nvPr/>
         </p:nvSpPr>
         <p:spPr>
           <a:xfrm rot="16200000">
-            <a:off x="3698413" y="516521"/>
-            <a:ext cx="1033232" cy="276999"/>
+            <a:off x="4569822" y="5735435"/>
+            <a:ext cx="569387" cy="276999"/>
           </a:xfrm>
           <a:prstGeom prst="rect">
             <a:avLst/>
@@ -3771,11 +3783,7 @@
           <a:p>
             <a:r>
               <a:rPr lang="de-DE" sz="1200" dirty="0" smtClean="0"/>
-              <a:t>DC/DC </a:t>
-            </a:r>
-            <a:r>
-              <a:rPr lang="de-DE" sz="1200" dirty="0" err="1" smtClean="0"/>
-              <a:t>switch</a:t>
+              <a:t>Speed</a:t>
             </a:r>
             <a:endParaRPr lang="de-DE" sz="1200" dirty="0"/>
           </a:p>
@@ -3783,14 +3791,14 @@
       </p:sp>
       <p:sp>
         <p:nvSpPr>
-          <p:cNvPr id="48" name="Textfeld 47"/>
+          <p:cNvPr id="25" name="Textfeld 24"/>
           <p:cNvSpPr txBox="1"/>
           <p:nvPr/>
         </p:nvSpPr>
         <p:spPr>
-          <a:xfrm rot="16200000">
-            <a:off x="4569822" y="5735435"/>
-            <a:ext cx="569387" cy="276999"/>
+          <a:xfrm>
+            <a:off x="838691" y="4325754"/>
+            <a:ext cx="1459117" cy="276999"/>
           </a:xfrm>
           <a:prstGeom prst="rect">
             <a:avLst/>
@@ -3805,7 +3813,19 @@
           <a:p>
             <a:r>
               <a:rPr lang="de-DE" sz="1200" dirty="0" smtClean="0"/>
-              <a:t>Speed</a:t>
+              <a:t>ADC </a:t>
+            </a:r>
+            <a:r>
+              <a:rPr lang="de-DE" sz="1200" dirty="0" err="1" smtClean="0"/>
+              <a:t>Battery</a:t>
+            </a:r>
+            <a:r>
+              <a:rPr lang="de-DE" sz="1200" dirty="0"/>
+              <a:t> </a:t>
+            </a:r>
+            <a:r>
+              <a:rPr lang="de-DE" sz="1200" dirty="0" err="1" smtClean="0"/>
+              <a:t>Current</a:t>
             </a:r>
             <a:endParaRPr lang="de-DE" sz="1200" dirty="0"/>
           </a:p>
@@ -3813,14 +3833,14 @@
       </p:sp>
       <p:sp>
         <p:nvSpPr>
-          <p:cNvPr id="25" name="Textfeld 24"/>
+          <p:cNvPr id="26" name="Textfeld 25"/>
           <p:cNvSpPr txBox="1"/>
           <p:nvPr/>
         </p:nvSpPr>
         <p:spPr>
-          <a:xfrm>
-            <a:off x="721657" y="4325754"/>
-            <a:ext cx="1459117" cy="276999"/>
+          <a:xfrm rot="16200000">
+            <a:off x="3574797" y="5976547"/>
+            <a:ext cx="986296" cy="276999"/>
           </a:xfrm>
           <a:prstGeom prst="rect">
             <a:avLst/>
@@ -3839,15 +3859,7 @@
             </a:r>
             <a:r>
               <a:rPr lang="de-DE" sz="1200" dirty="0" err="1" smtClean="0"/>
-              <a:t>Battery</a:t>
-            </a:r>
-            <a:r>
-              <a:rPr lang="de-DE" sz="1200" dirty="0"/>
-              <a:t> </a:t>
-            </a:r>
-            <a:r>
-              <a:rPr lang="de-DE" sz="1200" dirty="0" err="1" smtClean="0"/>
-              <a:t>Current</a:t>
+              <a:t>Throttle</a:t>
             </a:r>
             <a:endParaRPr lang="de-DE" sz="1200" dirty="0"/>
           </a:p>
@@ -3855,14 +3867,14 @@
       </p:sp>
       <p:sp>
         <p:nvSpPr>
-          <p:cNvPr id="26" name="Textfeld 25"/>
+          <p:cNvPr id="27" name="Textfeld 26"/>
           <p:cNvSpPr txBox="1"/>
           <p:nvPr/>
         </p:nvSpPr>
         <p:spPr>
-          <a:xfrm rot="16200000">
-            <a:off x="3574797" y="5976547"/>
-            <a:ext cx="986296" cy="276999"/>
+          <a:xfrm>
+            <a:off x="867032" y="3726161"/>
+            <a:ext cx="1430776" cy="276999"/>
           </a:xfrm>
           <a:prstGeom prst="rect">
             <a:avLst/>
@@ -3881,7 +3893,15 @@
             </a:r>
             <a:r>
               <a:rPr lang="de-DE" sz="1200" dirty="0" err="1" smtClean="0"/>
-              <a:t>Throttle</a:t>
+              <a:t>Battery</a:t>
+            </a:r>
+            <a:r>
+              <a:rPr lang="de-DE" sz="1200" dirty="0" smtClean="0"/>
+              <a:t> </a:t>
+            </a:r>
+            <a:r>
+              <a:rPr lang="de-DE" sz="1200" dirty="0" err="1" smtClean="0"/>
+              <a:t>voltage</a:t>
             </a:r>
             <a:endParaRPr lang="de-DE" sz="1200" dirty="0"/>
           </a:p>
@@ -3889,14 +3909,14 @@
       </p:sp>
       <p:sp>
         <p:nvSpPr>
-          <p:cNvPr id="27" name="Textfeld 26"/>
+          <p:cNvPr id="28" name="Textfeld 27"/>
           <p:cNvSpPr txBox="1"/>
           <p:nvPr/>
         </p:nvSpPr>
         <p:spPr>
-          <a:xfrm>
-            <a:off x="827584" y="3726161"/>
-            <a:ext cx="1430776" cy="276999"/>
+          <a:xfrm rot="16200000">
+            <a:off x="2521231" y="6229657"/>
+            <a:ext cx="2218300" cy="276999"/>
           </a:xfrm>
           <a:prstGeom prst="rect">
             <a:avLst/>
@@ -3925,20 +3945,36 @@
               <a:rPr lang="de-DE" sz="1200" dirty="0" err="1" smtClean="0"/>
               <a:t>voltage</a:t>
             </a:r>
+            <a:r>
+              <a:rPr lang="de-DE" sz="1200" dirty="0" smtClean="0"/>
+              <a:t> </a:t>
+            </a:r>
+            <a:r>
+              <a:rPr lang="de-DE" sz="1200" dirty="0" err="1" smtClean="0"/>
+              <a:t>with</a:t>
+            </a:r>
+            <a:r>
+              <a:rPr lang="de-DE" sz="1200" dirty="0" smtClean="0"/>
+              <a:t> </a:t>
+            </a:r>
+            <a:r>
+              <a:rPr lang="de-DE" sz="1200" dirty="0" err="1" smtClean="0"/>
+              <a:t>offset</a:t>
+            </a:r>
             <a:endParaRPr lang="de-DE" sz="1200" dirty="0"/>
           </a:p>
         </p:txBody>
       </p:sp>
       <p:sp>
         <p:nvSpPr>
-          <p:cNvPr id="28" name="Textfeld 27"/>
+          <p:cNvPr id="30" name="Textfeld 29"/>
           <p:cNvSpPr txBox="1"/>
           <p:nvPr/>
         </p:nvSpPr>
         <p:spPr>
-          <a:xfrm rot="16200000">
-            <a:off x="2521231" y="6229657"/>
-            <a:ext cx="2218300" cy="276999"/>
+          <a:xfrm>
+            <a:off x="1763751" y="1938604"/>
+            <a:ext cx="534057" cy="276999"/>
           </a:xfrm>
           <a:prstGeom prst="rect">
             <a:avLst/>
@@ -3953,35 +3989,7 @@
           <a:p>
             <a:r>
               <a:rPr lang="de-DE" sz="1200" dirty="0" smtClean="0"/>
-              <a:t>ADC </a:t>
-            </a:r>
-            <a:r>
-              <a:rPr lang="de-DE" sz="1200" dirty="0" err="1" smtClean="0"/>
-              <a:t>Battery</a:t>
-            </a:r>
-            <a:r>
-              <a:rPr lang="de-DE" sz="1200" dirty="0" smtClean="0"/>
-              <a:t> </a:t>
-            </a:r>
-            <a:r>
-              <a:rPr lang="de-DE" sz="1200" dirty="0" err="1" smtClean="0"/>
-              <a:t>voltage</a:t>
-            </a:r>
-            <a:r>
-              <a:rPr lang="de-DE" sz="1200" dirty="0" smtClean="0"/>
-              <a:t> </a:t>
-            </a:r>
-            <a:r>
-              <a:rPr lang="de-DE" sz="1200" dirty="0" err="1" smtClean="0"/>
-              <a:t>with</a:t>
-            </a:r>
-            <a:r>
-              <a:rPr lang="de-DE" sz="1200" dirty="0" smtClean="0"/>
-              <a:t> </a:t>
-            </a:r>
-            <a:r>
-              <a:rPr lang="de-DE" sz="1200" dirty="0" err="1" smtClean="0"/>
-              <a:t>offset</a:t>
+              <a:t>Brake</a:t>
             </a:r>
             <a:endParaRPr lang="de-DE" sz="1200" dirty="0"/>
           </a:p>
@@ -3989,14 +3997,14 @@
       </p:sp>
       <p:sp>
         <p:nvSpPr>
-          <p:cNvPr id="30" name="Textfeld 29"/>
+          <p:cNvPr id="31" name="Textfeld 30"/>
           <p:cNvSpPr txBox="1"/>
           <p:nvPr/>
         </p:nvSpPr>
         <p:spPr>
-          <a:xfrm>
-            <a:off x="1690143" y="1938604"/>
-            <a:ext cx="534057" cy="276999"/>
+          <a:xfrm rot="16200000">
+            <a:off x="5352616" y="478109"/>
+            <a:ext cx="1020023" cy="276999"/>
           </a:xfrm>
           <a:prstGeom prst="rect">
             <a:avLst/>
@@ -4011,7 +4019,15 @@
           <a:p>
             <a:r>
               <a:rPr lang="de-DE" sz="1200" dirty="0" smtClean="0"/>
-              <a:t>Brake</a:t>
+              <a:t>PAS (</a:t>
+            </a:r>
+            <a:r>
+              <a:rPr lang="de-DE" sz="1200" dirty="0" err="1" smtClean="0"/>
+              <a:t>green</a:t>
+            </a:r>
+            <a:r>
+              <a:rPr lang="de-DE" sz="1200" dirty="0" smtClean="0"/>
+              <a:t>?!)</a:t>
             </a:r>
             <a:endParaRPr lang="de-DE" sz="1200" dirty="0"/>
           </a:p>
@@ -4019,14 +4035,14 @@
       </p:sp>
       <p:sp>
         <p:nvSpPr>
-          <p:cNvPr id="31" name="Textfeld 30"/>
+          <p:cNvPr id="32" name="Textfeld 31"/>
           <p:cNvSpPr txBox="1"/>
           <p:nvPr/>
         </p:nvSpPr>
         <p:spPr>
-          <a:xfrm rot="16200000">
-            <a:off x="5352616" y="478109"/>
-            <a:ext cx="1020023" cy="276999"/>
+          <a:xfrm>
+            <a:off x="842217" y="4725144"/>
+            <a:ext cx="1455591" cy="276999"/>
           </a:xfrm>
           <a:prstGeom prst="rect">
             <a:avLst/>
@@ -4041,15 +4057,19 @@
           <a:p>
             <a:r>
               <a:rPr lang="de-DE" sz="1200" dirty="0" smtClean="0"/>
-              <a:t>PAS (</a:t>
+              <a:t>ADC </a:t>
             </a:r>
             <a:r>
               <a:rPr lang="de-DE" sz="1200" dirty="0" err="1" smtClean="0"/>
-              <a:t>green</a:t>
+              <a:t>PhaseA</a:t>
             </a:r>
             <a:r>
               <a:rPr lang="de-DE" sz="1200" dirty="0" smtClean="0"/>
-              <a:t>?!)</a:t>
+              <a:t> </a:t>
+            </a:r>
+            <a:r>
+              <a:rPr lang="de-DE" sz="1200" dirty="0" err="1" smtClean="0"/>
+              <a:t>Current</a:t>
             </a:r>
             <a:endParaRPr lang="de-DE" sz="1200" dirty="0"/>
           </a:p>
@@ -4057,14 +4077,14 @@
       </p:sp>
       <p:sp>
         <p:nvSpPr>
-          <p:cNvPr id="32" name="Textfeld 31"/>
+          <p:cNvPr id="33" name="Textfeld 32"/>
           <p:cNvSpPr txBox="1"/>
           <p:nvPr/>
         </p:nvSpPr>
         <p:spPr>
-          <a:xfrm>
-            <a:off x="746097" y="4725144"/>
-            <a:ext cx="1455591" cy="276999"/>
+          <a:xfrm rot="16200000">
+            <a:off x="2268750" y="6175331"/>
+            <a:ext cx="1449179" cy="276999"/>
           </a:xfrm>
           <a:prstGeom prst="rect">
             <a:avLst/>
@@ -4083,7 +4103,7 @@
             </a:r>
             <a:r>
               <a:rPr lang="de-DE" sz="1200" dirty="0" err="1" smtClean="0"/>
-              <a:t>PhaseA</a:t>
+              <a:t>PhaseB</a:t>
             </a:r>
             <a:r>
               <a:rPr lang="de-DE" sz="1200" dirty="0" smtClean="0"/>
@@ -4099,14 +4119,14 @@
       </p:sp>
       <p:sp>
         <p:nvSpPr>
-          <p:cNvPr id="33" name="Textfeld 32"/>
+          <p:cNvPr id="34" name="Textfeld 33"/>
           <p:cNvSpPr txBox="1"/>
           <p:nvPr/>
         </p:nvSpPr>
         <p:spPr>
           <a:xfrm rot="16200000">
-            <a:off x="2268750" y="6175331"/>
-            <a:ext cx="1449179" cy="276999"/>
+            <a:off x="3092232" y="6157668"/>
+            <a:ext cx="1447576" cy="276999"/>
           </a:xfrm>
           <a:prstGeom prst="rect">
             <a:avLst/>
@@ -4125,7 +4145,7 @@
             </a:r>
             <a:r>
               <a:rPr lang="de-DE" sz="1200" dirty="0" err="1" smtClean="0"/>
-              <a:t>PhaseB</a:t>
+              <a:t>PhaseC</a:t>
             </a:r>
             <a:r>
               <a:rPr lang="de-DE" sz="1200" dirty="0" smtClean="0"/>
@@ -4141,14 +4161,14 @@
       </p:sp>
       <p:sp>
         <p:nvSpPr>
-          <p:cNvPr id="34" name="Textfeld 33"/>
+          <p:cNvPr id="35" name="Textfeld 34"/>
           <p:cNvSpPr txBox="1"/>
           <p:nvPr/>
         </p:nvSpPr>
         <p:spPr>
           <a:xfrm rot="16200000">
-            <a:off x="3092232" y="6157668"/>
-            <a:ext cx="1447576" cy="276999"/>
+            <a:off x="3219691" y="605036"/>
+            <a:ext cx="821379" cy="276999"/>
           </a:xfrm>
           <a:prstGeom prst="rect">
             <a:avLst/>
@@ -4163,21 +4183,81 @@
           <a:p>
             <a:r>
               <a:rPr lang="de-DE" sz="1200" dirty="0" smtClean="0"/>
-              <a:t>ADC </a:t>
-            </a:r>
-            <a:r>
-              <a:rPr lang="de-DE" sz="1200" dirty="0" err="1" smtClean="0"/>
-              <a:t>PhaseC</a:t>
-            </a:r>
+              <a:t>Encoder Z</a:t>
+            </a:r>
+            <a:endParaRPr lang="de-DE" sz="1200" dirty="0"/>
+          </a:p>
+        </p:txBody>
+      </p:sp>
+      <p:sp>
+        <p:nvSpPr>
+          <p:cNvPr id="36" name="Textfeld 35"/>
+          <p:cNvSpPr txBox="1"/>
+          <p:nvPr/>
+        </p:nvSpPr>
+        <p:spPr>
+          <a:xfrm>
+            <a:off x="1218345" y="4534797"/>
+            <a:ext cx="1079463" cy="276999"/>
+          </a:xfrm>
+          <a:prstGeom prst="rect">
+            <a:avLst/>
+          </a:prstGeom>
+          <a:noFill/>
+        </p:spPr>
+        <p:txBody>
+          <a:bodyPr wrap="none" rtlCol="0">
+            <a:spAutoFit/>
+          </a:bodyPr>
+          <a:lstStyle/>
+          <a:p>
             <a:r>
               <a:rPr lang="de-DE" sz="1200" dirty="0" smtClean="0"/>
-              <a:t> </a:t>
-            </a:r>
-            <a:r>
-              <a:rPr lang="de-DE" sz="1200" dirty="0" err="1" smtClean="0"/>
-              <a:t>Current</a:t>
+              <a:t>Encoder PWM</a:t>
             </a:r>
             <a:endParaRPr lang="de-DE" sz="1200" dirty="0"/>
+          </a:p>
+        </p:txBody>
+      </p:sp>
+      <p:sp>
+        <p:nvSpPr>
+          <p:cNvPr id="2" name="Textfeld 1"/>
+          <p:cNvSpPr txBox="1"/>
+          <p:nvPr/>
+        </p:nvSpPr>
+        <p:spPr>
+          <a:xfrm>
+            <a:off x="299783" y="285688"/>
+            <a:ext cx="2858155" cy="369332"/>
+          </a:xfrm>
+          <a:prstGeom prst="rect">
+            <a:avLst/>
+          </a:prstGeom>
+          <a:noFill/>
+        </p:spPr>
+        <p:txBody>
+          <a:bodyPr wrap="none" rtlCol="0">
+            <a:spAutoFit/>
+          </a:bodyPr>
+          <a:lstStyle/>
+          <a:p>
+            <a:r>
+              <a:rPr lang="de-DE" dirty="0" smtClean="0"/>
+              <a:t>M510 </a:t>
+            </a:r>
+            <a:r>
+              <a:rPr lang="de-DE" dirty="0" err="1" smtClean="0"/>
+              <a:t>with</a:t>
+            </a:r>
+            <a:r>
+              <a:rPr lang="de-DE" dirty="0" smtClean="0"/>
+              <a:t> MT6816 </a:t>
+            </a:r>
+            <a:r>
+              <a:rPr lang="de-DE" dirty="0" err="1" smtClean="0"/>
+              <a:t>encoder</a:t>
+            </a:r>
+            <a:endParaRPr lang="de-DE" dirty="0"/>
           </a:p>
         </p:txBody>
       </p:sp>

</xml_diff>

<commit_message>
Update Branch with improvements of Master WIP
</commit_message>
<xml_diff>
--- a/documentation/BANFANGHUB Pinout.pptx
+++ b/documentation/BANFANGHUB Pinout.pptx
@@ -6,7 +6,6 @@
   </p:sldMasterIdLst>
   <p:sldIdLst>
     <p:sldId id="256" r:id="rId2"/>
-    <p:sldId id="257" r:id="rId3"/>
   </p:sldIdLst>
   <p:sldSz cx="9144000" cy="6858000" type="screen4x3"/>
   <p:notesSz cx="6858000" cy="9144000"/>
@@ -105,22 +104,6 @@
       </a:defRPr>
     </a:lvl9pPr>
   </p:defaultTextStyle>
-  <p:extLst>
-    <p:ext uri="{EFAFB233-063F-42B5-8137-9DF3F51BA10A}">
-      <p15:sldGuideLst xmlns:p15="http://schemas.microsoft.com/office/powerpoint/2012/main">
-        <p15:guide id="1" orient="horz" pos="2160">
-          <p15:clr>
-            <a:srgbClr val="A4A3A4"/>
-          </p15:clr>
-        </p15:guide>
-        <p15:guide id="2" pos="2880">
-          <p15:clr>
-            <a:srgbClr val="A4A3A4"/>
-          </p15:clr>
-        </p15:guide>
-      </p15:sldGuideLst>
-    </p:ext>
-  </p:extLst>
 </p:presentation>
 </file>
 
@@ -162,9 +145,10 @@
           <a:lstStyle/>
           <a:p>
             <a:r>
-              <a:rPr lang="de-DE"/>
+              <a:rPr lang="de-DE" smtClean="0"/>
               <a:t>Titelmasterformat durch Klicken bearbeiten</a:t>
             </a:r>
+            <a:endParaRPr lang="de-DE"/>
           </a:p>
         </p:txBody>
       </p:sp>
@@ -280,9 +264,10 @@
           </a:lstStyle>
           <a:p>
             <a:r>
-              <a:rPr lang="de-DE"/>
+              <a:rPr lang="de-DE" smtClean="0"/>
               <a:t>Formatvorlage des Untertitelmasters durch Klicken bearbeiten</a:t>
             </a:r>
+            <a:endParaRPr lang="de-DE"/>
           </a:p>
         </p:txBody>
       </p:sp>
@@ -303,7 +288,7 @@
           <a:p>
             <a:fld id="{35FD3595-6B9E-46C3-8029-CE7D28936448}" type="datetimeFigureOut">
               <a:rPr lang="de-DE" smtClean="0"/>
-              <a:t>17.10.2025</a:t>
+              <a:t>28.09.2025</a:t>
             </a:fld>
             <a:endParaRPr lang="de-DE"/>
           </a:p>
@@ -397,9 +382,10 @@
           <a:lstStyle/>
           <a:p>
             <a:r>
-              <a:rPr lang="de-DE"/>
+              <a:rPr lang="de-DE" smtClean="0"/>
               <a:t>Titelmasterformat durch Klicken bearbeiten</a:t>
             </a:r>
+            <a:endParaRPr lang="de-DE"/>
           </a:p>
         </p:txBody>
       </p:sp>
@@ -420,37 +406,38 @@
           <a:p>
             <a:pPr lvl="0"/>
             <a:r>
-              <a:rPr lang="de-DE"/>
+              <a:rPr lang="de-DE" smtClean="0"/>
               <a:t>Textmasterformat bearbeiten</a:t>
             </a:r>
           </a:p>
           <a:p>
             <a:pPr lvl="1"/>
             <a:r>
-              <a:rPr lang="de-DE"/>
+              <a:rPr lang="de-DE" smtClean="0"/>
               <a:t>Zweite Ebene</a:t>
             </a:r>
           </a:p>
           <a:p>
             <a:pPr lvl="2"/>
             <a:r>
-              <a:rPr lang="de-DE"/>
+              <a:rPr lang="de-DE" smtClean="0"/>
               <a:t>Dritte Ebene</a:t>
             </a:r>
           </a:p>
           <a:p>
             <a:pPr lvl="3"/>
             <a:r>
-              <a:rPr lang="de-DE"/>
+              <a:rPr lang="de-DE" smtClean="0"/>
               <a:t>Vierte Ebene</a:t>
             </a:r>
           </a:p>
           <a:p>
             <a:pPr lvl="4"/>
             <a:r>
-              <a:rPr lang="de-DE"/>
+              <a:rPr lang="de-DE" smtClean="0"/>
               <a:t>Fünfte Ebene</a:t>
             </a:r>
+            <a:endParaRPr lang="de-DE"/>
           </a:p>
         </p:txBody>
       </p:sp>
@@ -471,7 +458,7 @@
           <a:p>
             <a:fld id="{35FD3595-6B9E-46C3-8029-CE7D28936448}" type="datetimeFigureOut">
               <a:rPr lang="de-DE" smtClean="0"/>
-              <a:t>17.10.2025</a:t>
+              <a:t>28.09.2025</a:t>
             </a:fld>
             <a:endParaRPr lang="de-DE"/>
           </a:p>
@@ -570,9 +557,10 @@
           <a:lstStyle/>
           <a:p>
             <a:r>
-              <a:rPr lang="de-DE"/>
+              <a:rPr lang="de-DE" smtClean="0"/>
               <a:t>Titelmasterformat durch Klicken bearbeiten</a:t>
             </a:r>
+            <a:endParaRPr lang="de-DE"/>
           </a:p>
         </p:txBody>
       </p:sp>
@@ -598,37 +586,38 @@
           <a:p>
             <a:pPr lvl="0"/>
             <a:r>
-              <a:rPr lang="de-DE"/>
+              <a:rPr lang="de-DE" smtClean="0"/>
               <a:t>Textmasterformat bearbeiten</a:t>
             </a:r>
           </a:p>
           <a:p>
             <a:pPr lvl="1"/>
             <a:r>
-              <a:rPr lang="de-DE"/>
+              <a:rPr lang="de-DE" smtClean="0"/>
               <a:t>Zweite Ebene</a:t>
             </a:r>
           </a:p>
           <a:p>
             <a:pPr lvl="2"/>
             <a:r>
-              <a:rPr lang="de-DE"/>
+              <a:rPr lang="de-DE" smtClean="0"/>
               <a:t>Dritte Ebene</a:t>
             </a:r>
           </a:p>
           <a:p>
             <a:pPr lvl="3"/>
             <a:r>
-              <a:rPr lang="de-DE"/>
+              <a:rPr lang="de-DE" smtClean="0"/>
               <a:t>Vierte Ebene</a:t>
             </a:r>
           </a:p>
           <a:p>
             <a:pPr lvl="4"/>
             <a:r>
-              <a:rPr lang="de-DE"/>
+              <a:rPr lang="de-DE" smtClean="0"/>
               <a:t>Fünfte Ebene</a:t>
             </a:r>
+            <a:endParaRPr lang="de-DE"/>
           </a:p>
         </p:txBody>
       </p:sp>
@@ -649,7 +638,7 @@
           <a:p>
             <a:fld id="{35FD3595-6B9E-46C3-8029-CE7D28936448}" type="datetimeFigureOut">
               <a:rPr lang="de-DE" smtClean="0"/>
-              <a:t>17.10.2025</a:t>
+              <a:t>28.09.2025</a:t>
             </a:fld>
             <a:endParaRPr lang="de-DE"/>
           </a:p>
@@ -743,9 +732,10 @@
           <a:lstStyle/>
           <a:p>
             <a:r>
-              <a:rPr lang="de-DE"/>
+              <a:rPr lang="de-DE" smtClean="0"/>
               <a:t>Titelmasterformat durch Klicken bearbeiten</a:t>
             </a:r>
+            <a:endParaRPr lang="de-DE"/>
           </a:p>
         </p:txBody>
       </p:sp>
@@ -766,37 +756,38 @@
           <a:p>
             <a:pPr lvl="0"/>
             <a:r>
-              <a:rPr lang="de-DE"/>
+              <a:rPr lang="de-DE" smtClean="0"/>
               <a:t>Textmasterformat bearbeiten</a:t>
             </a:r>
           </a:p>
           <a:p>
             <a:pPr lvl="1"/>
             <a:r>
-              <a:rPr lang="de-DE"/>
+              <a:rPr lang="de-DE" smtClean="0"/>
               <a:t>Zweite Ebene</a:t>
             </a:r>
           </a:p>
           <a:p>
             <a:pPr lvl="2"/>
             <a:r>
-              <a:rPr lang="de-DE"/>
+              <a:rPr lang="de-DE" smtClean="0"/>
               <a:t>Dritte Ebene</a:t>
             </a:r>
           </a:p>
           <a:p>
             <a:pPr lvl="3"/>
             <a:r>
-              <a:rPr lang="de-DE"/>
+              <a:rPr lang="de-DE" smtClean="0"/>
               <a:t>Vierte Ebene</a:t>
             </a:r>
           </a:p>
           <a:p>
             <a:pPr lvl="4"/>
             <a:r>
-              <a:rPr lang="de-DE"/>
+              <a:rPr lang="de-DE" smtClean="0"/>
               <a:t>Fünfte Ebene</a:t>
             </a:r>
+            <a:endParaRPr lang="de-DE"/>
           </a:p>
         </p:txBody>
       </p:sp>
@@ -817,7 +808,7 @@
           <a:p>
             <a:fld id="{35FD3595-6B9E-46C3-8029-CE7D28936448}" type="datetimeFigureOut">
               <a:rPr lang="de-DE" smtClean="0"/>
-              <a:t>17.10.2025</a:t>
+              <a:t>28.09.2025</a:t>
             </a:fld>
             <a:endParaRPr lang="de-DE"/>
           </a:p>
@@ -920,9 +911,10 @@
           </a:lstStyle>
           <a:p>
             <a:r>
-              <a:rPr lang="de-DE"/>
+              <a:rPr lang="de-DE" smtClean="0"/>
               <a:t>Titelmasterformat durch Klicken bearbeiten</a:t>
             </a:r>
+            <a:endParaRPr lang="de-DE"/>
           </a:p>
         </p:txBody>
       </p:sp>
@@ -1039,7 +1031,7 @@
           <a:p>
             <a:pPr lvl="0"/>
             <a:r>
-              <a:rPr lang="de-DE"/>
+              <a:rPr lang="de-DE" smtClean="0"/>
               <a:t>Textmasterformat bearbeiten</a:t>
             </a:r>
           </a:p>
@@ -1062,7 +1054,7 @@
           <a:p>
             <a:fld id="{35FD3595-6B9E-46C3-8029-CE7D28936448}" type="datetimeFigureOut">
               <a:rPr lang="de-DE" smtClean="0"/>
-              <a:t>17.10.2025</a:t>
+              <a:t>28.09.2025</a:t>
             </a:fld>
             <a:endParaRPr lang="de-DE"/>
           </a:p>
@@ -1156,9 +1148,10 @@
           <a:lstStyle/>
           <a:p>
             <a:r>
-              <a:rPr lang="de-DE"/>
+              <a:rPr lang="de-DE" smtClean="0"/>
               <a:t>Titelmasterformat durch Klicken bearbeiten</a:t>
             </a:r>
+            <a:endParaRPr lang="de-DE"/>
           </a:p>
         </p:txBody>
       </p:sp>
@@ -1212,37 +1205,38 @@
           <a:p>
             <a:pPr lvl="0"/>
             <a:r>
-              <a:rPr lang="de-DE"/>
+              <a:rPr lang="de-DE" smtClean="0"/>
               <a:t>Textmasterformat bearbeiten</a:t>
             </a:r>
           </a:p>
           <a:p>
             <a:pPr lvl="1"/>
             <a:r>
-              <a:rPr lang="de-DE"/>
+              <a:rPr lang="de-DE" smtClean="0"/>
               <a:t>Zweite Ebene</a:t>
             </a:r>
           </a:p>
           <a:p>
             <a:pPr lvl="2"/>
             <a:r>
-              <a:rPr lang="de-DE"/>
+              <a:rPr lang="de-DE" smtClean="0"/>
               <a:t>Dritte Ebene</a:t>
             </a:r>
           </a:p>
           <a:p>
             <a:pPr lvl="3"/>
             <a:r>
-              <a:rPr lang="de-DE"/>
+              <a:rPr lang="de-DE" smtClean="0"/>
               <a:t>Vierte Ebene</a:t>
             </a:r>
           </a:p>
           <a:p>
             <a:pPr lvl="4"/>
             <a:r>
-              <a:rPr lang="de-DE"/>
+              <a:rPr lang="de-DE" smtClean="0"/>
               <a:t>Fünfte Ebene</a:t>
             </a:r>
+            <a:endParaRPr lang="de-DE"/>
           </a:p>
         </p:txBody>
       </p:sp>
@@ -1296,37 +1290,38 @@
           <a:p>
             <a:pPr lvl="0"/>
             <a:r>
-              <a:rPr lang="de-DE"/>
+              <a:rPr lang="de-DE" smtClean="0"/>
               <a:t>Textmasterformat bearbeiten</a:t>
             </a:r>
           </a:p>
           <a:p>
             <a:pPr lvl="1"/>
             <a:r>
-              <a:rPr lang="de-DE"/>
+              <a:rPr lang="de-DE" smtClean="0"/>
               <a:t>Zweite Ebene</a:t>
             </a:r>
           </a:p>
           <a:p>
             <a:pPr lvl="2"/>
             <a:r>
-              <a:rPr lang="de-DE"/>
+              <a:rPr lang="de-DE" smtClean="0"/>
               <a:t>Dritte Ebene</a:t>
             </a:r>
           </a:p>
           <a:p>
             <a:pPr lvl="3"/>
             <a:r>
-              <a:rPr lang="de-DE"/>
+              <a:rPr lang="de-DE" smtClean="0"/>
               <a:t>Vierte Ebene</a:t>
             </a:r>
           </a:p>
           <a:p>
             <a:pPr lvl="4"/>
             <a:r>
-              <a:rPr lang="de-DE"/>
+              <a:rPr lang="de-DE" smtClean="0"/>
               <a:t>Fünfte Ebene</a:t>
             </a:r>
+            <a:endParaRPr lang="de-DE"/>
           </a:p>
         </p:txBody>
       </p:sp>
@@ -1347,7 +1342,7 @@
           <a:p>
             <a:fld id="{35FD3595-6B9E-46C3-8029-CE7D28936448}" type="datetimeFigureOut">
               <a:rPr lang="de-DE" smtClean="0"/>
-              <a:t>17.10.2025</a:t>
+              <a:t>28.09.2025</a:t>
             </a:fld>
             <a:endParaRPr lang="de-DE"/>
           </a:p>
@@ -1445,9 +1440,10 @@
           </a:lstStyle>
           <a:p>
             <a:r>
-              <a:rPr lang="de-DE"/>
+              <a:rPr lang="de-DE" smtClean="0"/>
               <a:t>Titelmasterformat durch Klicken bearbeiten</a:t>
             </a:r>
+            <a:endParaRPr lang="de-DE"/>
           </a:p>
         </p:txBody>
       </p:sp>
@@ -1510,7 +1506,7 @@
           <a:p>
             <a:pPr lvl="0"/>
             <a:r>
-              <a:rPr lang="de-DE"/>
+              <a:rPr lang="de-DE" smtClean="0"/>
               <a:t>Textmasterformat bearbeiten</a:t>
             </a:r>
           </a:p>
@@ -1566,37 +1562,38 @@
           <a:p>
             <a:pPr lvl="0"/>
             <a:r>
-              <a:rPr lang="de-DE"/>
+              <a:rPr lang="de-DE" smtClean="0"/>
               <a:t>Textmasterformat bearbeiten</a:t>
             </a:r>
           </a:p>
           <a:p>
             <a:pPr lvl="1"/>
             <a:r>
-              <a:rPr lang="de-DE"/>
+              <a:rPr lang="de-DE" smtClean="0"/>
               <a:t>Zweite Ebene</a:t>
             </a:r>
           </a:p>
           <a:p>
             <a:pPr lvl="2"/>
             <a:r>
-              <a:rPr lang="de-DE"/>
+              <a:rPr lang="de-DE" smtClean="0"/>
               <a:t>Dritte Ebene</a:t>
             </a:r>
           </a:p>
           <a:p>
             <a:pPr lvl="3"/>
             <a:r>
-              <a:rPr lang="de-DE"/>
+              <a:rPr lang="de-DE" smtClean="0"/>
               <a:t>Vierte Ebene</a:t>
             </a:r>
           </a:p>
           <a:p>
             <a:pPr lvl="4"/>
             <a:r>
-              <a:rPr lang="de-DE"/>
+              <a:rPr lang="de-DE" smtClean="0"/>
               <a:t>Fünfte Ebene</a:t>
             </a:r>
+            <a:endParaRPr lang="de-DE"/>
           </a:p>
         </p:txBody>
       </p:sp>
@@ -1659,7 +1656,7 @@
           <a:p>
             <a:pPr lvl="0"/>
             <a:r>
-              <a:rPr lang="de-DE"/>
+              <a:rPr lang="de-DE" smtClean="0"/>
               <a:t>Textmasterformat bearbeiten</a:t>
             </a:r>
           </a:p>
@@ -1715,37 +1712,38 @@
           <a:p>
             <a:pPr lvl="0"/>
             <a:r>
-              <a:rPr lang="de-DE"/>
+              <a:rPr lang="de-DE" smtClean="0"/>
               <a:t>Textmasterformat bearbeiten</a:t>
             </a:r>
           </a:p>
           <a:p>
             <a:pPr lvl="1"/>
             <a:r>
-              <a:rPr lang="de-DE"/>
+              <a:rPr lang="de-DE" smtClean="0"/>
               <a:t>Zweite Ebene</a:t>
             </a:r>
           </a:p>
           <a:p>
             <a:pPr lvl="2"/>
             <a:r>
-              <a:rPr lang="de-DE"/>
+              <a:rPr lang="de-DE" smtClean="0"/>
               <a:t>Dritte Ebene</a:t>
             </a:r>
           </a:p>
           <a:p>
             <a:pPr lvl="3"/>
             <a:r>
-              <a:rPr lang="de-DE"/>
+              <a:rPr lang="de-DE" smtClean="0"/>
               <a:t>Vierte Ebene</a:t>
             </a:r>
           </a:p>
           <a:p>
             <a:pPr lvl="4"/>
             <a:r>
-              <a:rPr lang="de-DE"/>
+              <a:rPr lang="de-DE" smtClean="0"/>
               <a:t>Fünfte Ebene</a:t>
             </a:r>
+            <a:endParaRPr lang="de-DE"/>
           </a:p>
         </p:txBody>
       </p:sp>
@@ -1766,7 +1764,7 @@
           <a:p>
             <a:fld id="{35FD3595-6B9E-46C3-8029-CE7D28936448}" type="datetimeFigureOut">
               <a:rPr lang="de-DE" smtClean="0"/>
-              <a:t>17.10.2025</a:t>
+              <a:t>28.09.2025</a:t>
             </a:fld>
             <a:endParaRPr lang="de-DE"/>
           </a:p>
@@ -1860,9 +1858,10 @@
           <a:lstStyle/>
           <a:p>
             <a:r>
-              <a:rPr lang="de-DE"/>
+              <a:rPr lang="de-DE" smtClean="0"/>
               <a:t>Titelmasterformat durch Klicken bearbeiten</a:t>
             </a:r>
+            <a:endParaRPr lang="de-DE"/>
           </a:p>
         </p:txBody>
       </p:sp>
@@ -1883,7 +1882,7 @@
           <a:p>
             <a:fld id="{35FD3595-6B9E-46C3-8029-CE7D28936448}" type="datetimeFigureOut">
               <a:rPr lang="de-DE" smtClean="0"/>
-              <a:t>17.10.2025</a:t>
+              <a:t>28.09.2025</a:t>
             </a:fld>
             <a:endParaRPr lang="de-DE"/>
           </a:p>
@@ -1978,7 +1977,7 @@
           <a:p>
             <a:fld id="{35FD3595-6B9E-46C3-8029-CE7D28936448}" type="datetimeFigureOut">
               <a:rPr lang="de-DE" smtClean="0"/>
-              <a:t>17.10.2025</a:t>
+              <a:t>28.09.2025</a:t>
             </a:fld>
             <a:endParaRPr lang="de-DE"/>
           </a:p>
@@ -2081,9 +2080,10 @@
           </a:lstStyle>
           <a:p>
             <a:r>
-              <a:rPr lang="de-DE"/>
+              <a:rPr lang="de-DE" smtClean="0"/>
               <a:t>Titelmasterformat durch Klicken bearbeiten</a:t>
             </a:r>
+            <a:endParaRPr lang="de-DE"/>
           </a:p>
         </p:txBody>
       </p:sp>
@@ -2137,37 +2137,38 @@
           <a:p>
             <a:pPr lvl="0"/>
             <a:r>
-              <a:rPr lang="de-DE"/>
+              <a:rPr lang="de-DE" smtClean="0"/>
               <a:t>Textmasterformat bearbeiten</a:t>
             </a:r>
           </a:p>
           <a:p>
             <a:pPr lvl="1"/>
             <a:r>
-              <a:rPr lang="de-DE"/>
+              <a:rPr lang="de-DE" smtClean="0"/>
               <a:t>Zweite Ebene</a:t>
             </a:r>
           </a:p>
           <a:p>
             <a:pPr lvl="2"/>
             <a:r>
-              <a:rPr lang="de-DE"/>
+              <a:rPr lang="de-DE" smtClean="0"/>
               <a:t>Dritte Ebene</a:t>
             </a:r>
           </a:p>
           <a:p>
             <a:pPr lvl="3"/>
             <a:r>
-              <a:rPr lang="de-DE"/>
+              <a:rPr lang="de-DE" smtClean="0"/>
               <a:t>Vierte Ebene</a:t>
             </a:r>
           </a:p>
           <a:p>
             <a:pPr lvl="4"/>
             <a:r>
-              <a:rPr lang="de-DE"/>
+              <a:rPr lang="de-DE" smtClean="0"/>
               <a:t>Fünfte Ebene</a:t>
             </a:r>
+            <a:endParaRPr lang="de-DE"/>
           </a:p>
         </p:txBody>
       </p:sp>
@@ -2230,7 +2231,7 @@
           <a:p>
             <a:pPr lvl="0"/>
             <a:r>
-              <a:rPr lang="de-DE"/>
+              <a:rPr lang="de-DE" smtClean="0"/>
               <a:t>Textmasterformat bearbeiten</a:t>
             </a:r>
           </a:p>
@@ -2253,7 +2254,7 @@
           <a:p>
             <a:fld id="{35FD3595-6B9E-46C3-8029-CE7D28936448}" type="datetimeFigureOut">
               <a:rPr lang="de-DE" smtClean="0"/>
-              <a:t>17.10.2025</a:t>
+              <a:t>28.09.2025</a:t>
             </a:fld>
             <a:endParaRPr lang="de-DE"/>
           </a:p>
@@ -2356,9 +2357,10 @@
           </a:lstStyle>
           <a:p>
             <a:r>
-              <a:rPr lang="de-DE"/>
+              <a:rPr lang="de-DE" smtClean="0"/>
               <a:t>Titelmasterformat durch Klicken bearbeiten</a:t>
             </a:r>
+            <a:endParaRPr lang="de-DE"/>
           </a:p>
         </p:txBody>
       </p:sp>
@@ -2482,7 +2484,7 @@
           <a:p>
             <a:pPr lvl="0"/>
             <a:r>
-              <a:rPr lang="de-DE"/>
+              <a:rPr lang="de-DE" smtClean="0"/>
               <a:t>Textmasterformat bearbeiten</a:t>
             </a:r>
           </a:p>
@@ -2505,7 +2507,7 @@
           <a:p>
             <a:fld id="{35FD3595-6B9E-46C3-8029-CE7D28936448}" type="datetimeFigureOut">
               <a:rPr lang="de-DE" smtClean="0"/>
-              <a:t>17.10.2025</a:t>
+              <a:t>28.09.2025</a:t>
             </a:fld>
             <a:endParaRPr lang="de-DE"/>
           </a:p>
@@ -2614,9 +2616,10 @@
           <a:lstStyle/>
           <a:p>
             <a:r>
-              <a:rPr lang="de-DE"/>
+              <a:rPr lang="de-DE" smtClean="0"/>
               <a:t>Titelmasterformat durch Klicken bearbeiten</a:t>
             </a:r>
+            <a:endParaRPr lang="de-DE"/>
           </a:p>
         </p:txBody>
       </p:sp>
@@ -2647,37 +2650,38 @@
           <a:p>
             <a:pPr lvl="0"/>
             <a:r>
-              <a:rPr lang="de-DE"/>
+              <a:rPr lang="de-DE" smtClean="0"/>
               <a:t>Textmasterformat bearbeiten</a:t>
             </a:r>
           </a:p>
           <a:p>
             <a:pPr lvl="1"/>
             <a:r>
-              <a:rPr lang="de-DE"/>
+              <a:rPr lang="de-DE" smtClean="0"/>
               <a:t>Zweite Ebene</a:t>
             </a:r>
           </a:p>
           <a:p>
             <a:pPr lvl="2"/>
             <a:r>
-              <a:rPr lang="de-DE"/>
+              <a:rPr lang="de-DE" smtClean="0"/>
               <a:t>Dritte Ebene</a:t>
             </a:r>
           </a:p>
           <a:p>
             <a:pPr lvl="3"/>
             <a:r>
-              <a:rPr lang="de-DE"/>
+              <a:rPr lang="de-DE" smtClean="0"/>
               <a:t>Vierte Ebene</a:t>
             </a:r>
           </a:p>
           <a:p>
             <a:pPr lvl="4"/>
             <a:r>
-              <a:rPr lang="de-DE"/>
+              <a:rPr lang="de-DE" smtClean="0"/>
               <a:t>Fünfte Ebene</a:t>
             </a:r>
+            <a:endParaRPr lang="de-DE"/>
           </a:p>
         </p:txBody>
       </p:sp>
@@ -2716,7 +2720,7 @@
           <a:p>
             <a:fld id="{35FD3595-6B9E-46C3-8029-CE7D28936448}" type="datetimeFigureOut">
               <a:rPr lang="de-DE" smtClean="0"/>
-              <a:t>17.10.2025</a:t>
+              <a:t>28.09.2025</a:t>
             </a:fld>
             <a:endParaRPr lang="de-DE"/>
           </a:p>
@@ -3153,7 +3157,7 @@
         </p:nvSpPr>
         <p:spPr>
           <a:xfrm>
-            <a:off x="6849637" y="2161780"/>
+            <a:off x="6895398" y="2161780"/>
             <a:ext cx="420308" cy="276999"/>
           </a:xfrm>
           <a:prstGeom prst="rect">
@@ -3168,9 +3172,10 @@
           <a:lstStyle/>
           <a:p>
             <a:r>
-              <a:rPr lang="de-DE" sz="1200" dirty="0"/>
+              <a:rPr lang="de-DE" sz="1200" dirty="0" smtClean="0"/>
               <a:t>DIO</a:t>
             </a:r>
+            <a:endParaRPr lang="de-DE" sz="1200" dirty="0"/>
           </a:p>
         </p:txBody>
       </p:sp>
@@ -3182,7 +3187,7 @@
         </p:nvSpPr>
         <p:spPr>
           <a:xfrm rot="16200000">
-            <a:off x="5838606" y="852907"/>
+            <a:off x="5838606" y="759541"/>
             <a:ext cx="410690" cy="276999"/>
           </a:xfrm>
           <a:prstGeom prst="rect">
@@ -3197,9 +3202,10 @@
           <a:lstStyle/>
           <a:p>
             <a:r>
-              <a:rPr lang="de-DE" sz="1200" dirty="0"/>
+              <a:rPr lang="de-DE" sz="1200" dirty="0" smtClean="0"/>
               <a:t>CLK</a:t>
             </a:r>
+            <a:endParaRPr lang="de-DE" sz="1200" dirty="0"/>
           </a:p>
         </p:txBody>
       </p:sp>
@@ -3211,7 +3217,7 @@
         </p:nvSpPr>
         <p:spPr>
           <a:xfrm>
-            <a:off x="6849637" y="2552870"/>
+            <a:off x="6854444" y="2552870"/>
             <a:ext cx="641522" cy="276999"/>
           </a:xfrm>
           <a:prstGeom prst="rect">
@@ -3226,12 +3232,16 @@
           <a:lstStyle/>
           <a:p>
             <a:r>
-              <a:rPr lang="de-DE" sz="1200" dirty="0"/>
+              <a:rPr lang="de-DE" sz="1200" dirty="0" smtClean="0"/>
               <a:t>CAN </a:t>
             </a:r>
             <a:r>
               <a:rPr lang="de-DE" sz="1200" dirty="0" err="1"/>
-              <a:t>Rx</a:t>
+              <a:t>R</a:t>
+            </a:r>
+            <a:r>
+              <a:rPr lang="de-DE" sz="1200" dirty="0" err="1" smtClean="0"/>
+              <a:t>x</a:t>
             </a:r>
             <a:endParaRPr lang="de-DE" sz="1200" dirty="0"/>
           </a:p>
@@ -3260,11 +3270,11 @@
           <a:lstStyle/>
           <a:p>
             <a:r>
-              <a:rPr lang="de-DE" sz="1200" dirty="0"/>
+              <a:rPr lang="de-DE" sz="1200" dirty="0" smtClean="0"/>
               <a:t>CAN </a:t>
             </a:r>
             <a:r>
-              <a:rPr lang="de-DE" sz="1200" dirty="0" err="1"/>
+              <a:rPr lang="de-DE" sz="1200" dirty="0" err="1" smtClean="0"/>
               <a:t>Tx</a:t>
             </a:r>
             <a:endParaRPr lang="de-DE" sz="1200" dirty="0"/>
@@ -3279,7 +3289,7 @@
         </p:nvSpPr>
         <p:spPr>
           <a:xfrm>
-            <a:off x="6849637" y="4725144"/>
+            <a:off x="6854444" y="4725144"/>
             <a:ext cx="963725" cy="276999"/>
           </a:xfrm>
           <a:prstGeom prst="rect">
@@ -3294,9 +3304,10 @@
           <a:lstStyle/>
           <a:p>
             <a:r>
-              <a:rPr lang="de-DE" sz="1200" dirty="0"/>
+              <a:rPr lang="de-DE" sz="1200" dirty="0" smtClean="0"/>
               <a:t>Timer0 BKIN</a:t>
             </a:r>
+            <a:endParaRPr lang="de-DE" sz="1200" dirty="0"/>
           </a:p>
         </p:txBody>
       </p:sp>
@@ -3323,9 +3334,10 @@
           <a:lstStyle/>
           <a:p>
             <a:r>
-              <a:rPr lang="de-DE" sz="1200" dirty="0"/>
+              <a:rPr lang="de-DE" sz="1200" dirty="0" smtClean="0"/>
               <a:t>Timer0 CH0 ON</a:t>
             </a:r>
+            <a:endParaRPr lang="de-DE" sz="1200" dirty="0"/>
           </a:p>
         </p:txBody>
       </p:sp>
@@ -3352,9 +3364,10 @@
           <a:lstStyle/>
           <a:p>
             <a:r>
-              <a:rPr lang="de-DE" sz="1200" dirty="0"/>
+              <a:rPr lang="de-DE" sz="1200" dirty="0" smtClean="0"/>
               <a:t>Timer0 CH1 ON</a:t>
             </a:r>
+            <a:endParaRPr lang="de-DE" sz="1200" dirty="0"/>
           </a:p>
         </p:txBody>
       </p:sp>
@@ -3381,9 +3394,10 @@
           <a:lstStyle/>
           <a:p>
             <a:r>
-              <a:rPr lang="de-DE" sz="1200" dirty="0"/>
+              <a:rPr lang="de-DE" sz="1200" dirty="0" smtClean="0"/>
               <a:t>Timer0 CH2 ON</a:t>
             </a:r>
+            <a:endParaRPr lang="de-DE" sz="1200" dirty="0"/>
           </a:p>
         </p:txBody>
       </p:sp>
@@ -3395,7 +3409,7 @@
         </p:nvSpPr>
         <p:spPr>
           <a:xfrm>
-            <a:off x="6849637" y="3119343"/>
+            <a:off x="6854682" y="3119343"/>
             <a:ext cx="954107" cy="276999"/>
           </a:xfrm>
           <a:prstGeom prst="rect">
@@ -3410,9 +3424,10 @@
           <a:lstStyle/>
           <a:p>
             <a:r>
-              <a:rPr lang="de-DE" sz="1200" dirty="0"/>
+              <a:rPr lang="de-DE" sz="1200" dirty="0" smtClean="0"/>
               <a:t>Timer0 CH0</a:t>
             </a:r>
+            <a:endParaRPr lang="de-DE" sz="1200" dirty="0"/>
           </a:p>
         </p:txBody>
       </p:sp>
@@ -3424,7 +3439,7 @@
         </p:nvSpPr>
         <p:spPr>
           <a:xfrm>
-            <a:off x="6849637" y="2924944"/>
+            <a:off x="6854682" y="2924944"/>
             <a:ext cx="918841" cy="276999"/>
           </a:xfrm>
           <a:prstGeom prst="rect">
@@ -3439,9 +3454,10 @@
           <a:lstStyle/>
           <a:p>
             <a:r>
-              <a:rPr lang="de-DE" sz="1200" dirty="0"/>
+              <a:rPr lang="de-DE" sz="1200" dirty="0" smtClean="0"/>
               <a:t>Timer0 CH1</a:t>
             </a:r>
+            <a:endParaRPr lang="de-DE" sz="1200" dirty="0"/>
           </a:p>
         </p:txBody>
       </p:sp>
@@ -3453,7 +3469,7 @@
         </p:nvSpPr>
         <p:spPr>
           <a:xfrm>
-            <a:off x="6849637" y="2745629"/>
+            <a:off x="6854682" y="2745629"/>
             <a:ext cx="918841" cy="276999"/>
           </a:xfrm>
           <a:prstGeom prst="rect">
@@ -3468,9 +3484,10 @@
           <a:lstStyle/>
           <a:p>
             <a:r>
-              <a:rPr lang="de-DE" sz="1200" dirty="0"/>
+              <a:rPr lang="de-DE" sz="1200" dirty="0" smtClean="0"/>
               <a:t>Timer0 CH2</a:t>
             </a:r>
+            <a:endParaRPr lang="de-DE" sz="1200" dirty="0"/>
           </a:p>
         </p:txBody>
       </p:sp>
@@ -3482,8 +3499,8 @@
         </p:nvSpPr>
         <p:spPr>
           <a:xfrm rot="16200000">
-            <a:off x="3497264" y="6106528"/>
-            <a:ext cx="1483483" cy="276999"/>
+            <a:off x="3730064" y="5910464"/>
+            <a:ext cx="952761" cy="276999"/>
           </a:xfrm>
           <a:prstGeom prst="rect">
             <a:avLst/>
@@ -3497,17 +3514,18 @@
           <a:lstStyle/>
           <a:p>
             <a:r>
-              <a:rPr lang="de-DE" sz="1200" dirty="0"/>
-              <a:t>ADC Torque (</a:t>
-            </a:r>
-            <a:r>
-              <a:rPr lang="de-DE" sz="1200" dirty="0" err="1"/>
-              <a:t>brown</a:t>
-            </a:r>
-            <a:r>
-              <a:rPr lang="de-DE" sz="1200" dirty="0"/>
-              <a:t>) </a:t>
-            </a:r>
+              <a:rPr lang="de-DE" sz="1200" dirty="0" smtClean="0"/>
+              <a:t>ADC </a:t>
+            </a:r>
+            <a:r>
+              <a:rPr lang="de-DE" sz="1200" dirty="0" err="1" smtClean="0"/>
+              <a:t>Torque</a:t>
+            </a:r>
+            <a:r>
+              <a:rPr lang="de-DE" sz="1200" dirty="0" smtClean="0"/>
+              <a:t> </a:t>
+            </a:r>
+            <a:endParaRPr lang="de-DE" sz="1200" dirty="0"/>
           </a:p>
         </p:txBody>
       </p:sp>
@@ -3519,7 +3537,7 @@
         </p:nvSpPr>
         <p:spPr>
           <a:xfrm>
-            <a:off x="1879104" y="2149014"/>
+            <a:off x="1763688" y="2149014"/>
             <a:ext cx="418704" cy="276999"/>
           </a:xfrm>
           <a:prstGeom prst="rect">
@@ -3534,9 +3552,10 @@
           <a:lstStyle/>
           <a:p>
             <a:r>
-              <a:rPr lang="de-DE" sz="1200" dirty="0"/>
+              <a:rPr lang="de-DE" sz="1200" dirty="0" smtClean="0"/>
               <a:t>LED</a:t>
             </a:r>
+            <a:endParaRPr lang="de-DE" sz="1200" dirty="0"/>
           </a:p>
         </p:txBody>
       </p:sp>
@@ -3563,9 +3582,10 @@
           <a:lstStyle/>
           <a:p>
             <a:r>
-              <a:rPr lang="de-DE" sz="1200" dirty="0"/>
+              <a:rPr lang="de-DE" sz="1200" dirty="0" smtClean="0"/>
               <a:t>OSC0ut</a:t>
             </a:r>
+            <a:endParaRPr lang="de-DE" sz="1200" dirty="0"/>
           </a:p>
         </p:txBody>
       </p:sp>
@@ -3577,7 +3597,7 @@
         </p:nvSpPr>
         <p:spPr>
           <a:xfrm>
-            <a:off x="1739642" y="2552284"/>
+            <a:off x="1648271" y="2552284"/>
             <a:ext cx="558166" cy="276999"/>
           </a:xfrm>
           <a:prstGeom prst="rect">
@@ -3592,7 +3612,7 @@
           <a:lstStyle/>
           <a:p>
             <a:r>
-              <a:rPr lang="de-DE" sz="1200" dirty="0" err="1"/>
+              <a:rPr lang="de-DE" sz="1200" dirty="0" err="1" smtClean="0"/>
               <a:t>OSCIn</a:t>
             </a:r>
             <a:endParaRPr lang="de-DE" sz="1200" dirty="0"/>
@@ -3607,8 +3627,8 @@
         </p:nvSpPr>
         <p:spPr>
           <a:xfrm>
-            <a:off x="6849637" y="3953151"/>
-            <a:ext cx="821379" cy="276999"/>
+            <a:off x="6939075" y="3953151"/>
+            <a:ext cx="550151" cy="276999"/>
           </a:xfrm>
           <a:prstGeom prst="rect">
             <a:avLst/>
@@ -3622,22 +3642,23 @@
           <a:lstStyle/>
           <a:p>
             <a:r>
-              <a:rPr lang="de-DE" sz="1200" dirty="0"/>
-              <a:t>Encoder A</a:t>
-            </a:r>
-          </a:p>
-        </p:txBody>
-      </p:sp>
-      <p:sp>
-        <p:nvSpPr>
-          <p:cNvPr id="22" name="Textfeld 21"/>
+              <a:rPr lang="de-DE" sz="1200" dirty="0" smtClean="0"/>
+              <a:t>Hall A</a:t>
+            </a:r>
+            <a:endParaRPr lang="de-DE" sz="1200" dirty="0"/>
+          </a:p>
+        </p:txBody>
+      </p:sp>
+      <p:sp>
+        <p:nvSpPr>
+          <p:cNvPr id="21" name="Textfeld 20"/>
           <p:cNvSpPr txBox="1"/>
           <p:nvPr/>
         </p:nvSpPr>
         <p:spPr>
           <a:xfrm>
-            <a:off x="6849637" y="3728065"/>
-            <a:ext cx="1064151" cy="276999"/>
+            <a:off x="6926261" y="3537652"/>
+            <a:ext cx="542136" cy="276999"/>
           </a:xfrm>
           <a:prstGeom prst="rect">
             <a:avLst/>
@@ -3645,28 +3666,29 @@
           <a:noFill/>
         </p:spPr>
         <p:txBody>
-          <a:bodyPr wrap="square" rtlCol="0">
+          <a:bodyPr wrap="none" rtlCol="0">
             <a:spAutoFit/>
           </a:bodyPr>
           <a:lstStyle/>
           <a:p>
             <a:r>
-              <a:rPr lang="de-DE" sz="1200" dirty="0"/>
-              <a:t>Encoder B</a:t>
-            </a:r>
-          </a:p>
-        </p:txBody>
-      </p:sp>
-      <p:sp>
-        <p:nvSpPr>
-          <p:cNvPr id="46" name="Textfeld 45"/>
+              <a:rPr lang="de-DE" sz="1200" dirty="0" smtClean="0"/>
+              <a:t>Hall C</a:t>
+            </a:r>
+            <a:endParaRPr lang="de-DE" sz="1200" dirty="0"/>
+          </a:p>
+        </p:txBody>
+      </p:sp>
+      <p:sp>
+        <p:nvSpPr>
+          <p:cNvPr id="22" name="Textfeld 21"/>
           <p:cNvSpPr txBox="1"/>
           <p:nvPr/>
         </p:nvSpPr>
         <p:spPr>
-          <a:xfrm rot="16200000">
-            <a:off x="3893581" y="520637"/>
-            <a:ext cx="1075231" cy="276999"/>
+          <a:xfrm>
+            <a:off x="6941572" y="3728065"/>
+            <a:ext cx="723651" cy="276999"/>
           </a:xfrm>
           <a:prstGeom prst="rect">
             <a:avLst/>
@@ -3674,22 +3696,14 @@
           <a:noFill/>
         </p:spPr>
         <p:txBody>
-          <a:bodyPr wrap="none" rtlCol="0">
+          <a:bodyPr wrap="square" rtlCol="0">
             <a:spAutoFit/>
           </a:bodyPr>
           <a:lstStyle/>
           <a:p>
             <a:r>
-              <a:rPr lang="de-DE" sz="1200" dirty="0" err="1"/>
-              <a:t>Battery</a:t>
-            </a:r>
-            <a:r>
-              <a:rPr lang="de-DE" sz="1200" dirty="0"/>
-              <a:t> </a:t>
-            </a:r>
-            <a:r>
-              <a:rPr lang="de-DE" sz="1200" dirty="0" err="1"/>
-              <a:t>switch</a:t>
+              <a:rPr lang="de-DE" sz="1200" dirty="0" smtClean="0"/>
+              <a:t>Hall B</a:t>
             </a:r>
             <a:endParaRPr lang="de-DE" sz="1200" dirty="0"/>
           </a:p>
@@ -3697,14 +3711,14 @@
       </p:sp>
       <p:sp>
         <p:nvSpPr>
-          <p:cNvPr id="47" name="Textfeld 46"/>
+          <p:cNvPr id="46" name="Textfeld 45"/>
           <p:cNvSpPr txBox="1"/>
           <p:nvPr/>
         </p:nvSpPr>
         <p:spPr>
           <a:xfrm rot="16200000">
-            <a:off x="3698413" y="541636"/>
-            <a:ext cx="1033232" cy="276999"/>
+            <a:off x="3893581" y="478110"/>
+            <a:ext cx="1075231" cy="276999"/>
           </a:xfrm>
           <a:prstGeom prst="rect">
             <a:avLst/>
@@ -3718,11 +3732,15 @@
           <a:lstStyle/>
           <a:p>
             <a:r>
-              <a:rPr lang="de-DE" sz="1200" dirty="0"/>
-              <a:t>DC/DC </a:t>
-            </a:r>
-            <a:r>
-              <a:rPr lang="de-DE" sz="1200" dirty="0" err="1"/>
+              <a:rPr lang="de-DE" sz="1200" dirty="0" err="1" smtClean="0"/>
+              <a:t>Battery</a:t>
+            </a:r>
+            <a:r>
+              <a:rPr lang="de-DE" sz="1200" dirty="0" smtClean="0"/>
+              <a:t> </a:t>
+            </a:r>
+            <a:r>
+              <a:rPr lang="de-DE" sz="1200" dirty="0" err="1" smtClean="0"/>
               <a:t>switch</a:t>
             </a:r>
             <a:endParaRPr lang="de-DE" sz="1200" dirty="0"/>
@@ -3731,14 +3749,14 @@
       </p:sp>
       <p:sp>
         <p:nvSpPr>
-          <p:cNvPr id="48" name="Textfeld 47"/>
+          <p:cNvPr id="47" name="Textfeld 46"/>
           <p:cNvSpPr txBox="1"/>
           <p:nvPr/>
         </p:nvSpPr>
         <p:spPr>
           <a:xfrm rot="16200000">
-            <a:off x="4569822" y="5649480"/>
-            <a:ext cx="569387" cy="276999"/>
+            <a:off x="3698413" y="516521"/>
+            <a:ext cx="1033232" cy="276999"/>
           </a:xfrm>
           <a:prstGeom prst="rect">
             <a:avLst/>
@@ -3752,22 +3770,27 @@
           <a:lstStyle/>
           <a:p>
             <a:r>
-              <a:rPr lang="de-DE" sz="1200" dirty="0"/>
-              <a:t>Speed</a:t>
-            </a:r>
-          </a:p>
-        </p:txBody>
-      </p:sp>
-      <p:sp>
-        <p:nvSpPr>
-          <p:cNvPr id="25" name="Textfeld 24"/>
+              <a:rPr lang="de-DE" sz="1200" dirty="0" smtClean="0"/>
+              <a:t>DC/DC </a:t>
+            </a:r>
+            <a:r>
+              <a:rPr lang="de-DE" sz="1200" dirty="0" err="1" smtClean="0"/>
+              <a:t>switch</a:t>
+            </a:r>
+            <a:endParaRPr lang="de-DE" sz="1200" dirty="0"/>
+          </a:p>
+        </p:txBody>
+      </p:sp>
+      <p:sp>
+        <p:nvSpPr>
+          <p:cNvPr id="48" name="Textfeld 47"/>
           <p:cNvSpPr txBox="1"/>
           <p:nvPr/>
         </p:nvSpPr>
         <p:spPr>
-          <a:xfrm>
-            <a:off x="838691" y="4325754"/>
-            <a:ext cx="1459117" cy="276999"/>
+          <a:xfrm rot="16200000">
+            <a:off x="4569822" y="5735435"/>
+            <a:ext cx="569387" cy="276999"/>
           </a:xfrm>
           <a:prstGeom prst="rect">
             <a:avLst/>
@@ -3781,20 +3804,8 @@
           <a:lstStyle/>
           <a:p>
             <a:r>
-              <a:rPr lang="de-DE" sz="1200" dirty="0"/>
-              <a:t>ADC </a:t>
-            </a:r>
-            <a:r>
-              <a:rPr lang="de-DE" sz="1200" dirty="0" err="1"/>
-              <a:t>Battery</a:t>
-            </a:r>
-            <a:r>
-              <a:rPr lang="de-DE" sz="1200" dirty="0"/>
-              <a:t> </a:t>
-            </a:r>
-            <a:r>
-              <a:rPr lang="de-DE" sz="1200" dirty="0" err="1"/>
-              <a:t>Current</a:t>
+              <a:rPr lang="de-DE" sz="1200" dirty="0" smtClean="0"/>
+              <a:t>Speed</a:t>
             </a:r>
             <a:endParaRPr lang="de-DE" sz="1200" dirty="0"/>
           </a:p>
@@ -3802,14 +3813,14 @@
       </p:sp>
       <p:sp>
         <p:nvSpPr>
-          <p:cNvPr id="26" name="Textfeld 25"/>
+          <p:cNvPr id="25" name="Textfeld 24"/>
           <p:cNvSpPr txBox="1"/>
           <p:nvPr/>
         </p:nvSpPr>
         <p:spPr>
-          <a:xfrm rot="16200000">
-            <a:off x="3574797" y="5857934"/>
-            <a:ext cx="986296" cy="276999"/>
+          <a:xfrm>
+            <a:off x="721657" y="4325754"/>
+            <a:ext cx="1459117" cy="276999"/>
           </a:xfrm>
           <a:prstGeom prst="rect">
             <a:avLst/>
@@ -3823,12 +3834,20 @@
           <a:lstStyle/>
           <a:p>
             <a:r>
+              <a:rPr lang="de-DE" sz="1200" dirty="0" smtClean="0"/>
+              <a:t>ADC </a:t>
+            </a:r>
+            <a:r>
+              <a:rPr lang="de-DE" sz="1200" dirty="0" err="1" smtClean="0"/>
+              <a:t>Battery</a:t>
+            </a:r>
+            <a:r>
               <a:rPr lang="de-DE" sz="1200" dirty="0"/>
-              <a:t>ADC </a:t>
-            </a:r>
-            <a:r>
-              <a:rPr lang="de-DE" sz="1200" dirty="0" err="1"/>
-              <a:t>Throttle</a:t>
+              <a:t> </a:t>
+            </a:r>
+            <a:r>
+              <a:rPr lang="de-DE" sz="1200" dirty="0" err="1" smtClean="0"/>
+              <a:t>Current</a:t>
             </a:r>
             <a:endParaRPr lang="de-DE" sz="1200" dirty="0"/>
           </a:p>
@@ -3836,14 +3855,14 @@
       </p:sp>
       <p:sp>
         <p:nvSpPr>
-          <p:cNvPr id="27" name="Textfeld 26"/>
+          <p:cNvPr id="26" name="Textfeld 25"/>
           <p:cNvSpPr txBox="1"/>
           <p:nvPr/>
         </p:nvSpPr>
         <p:spPr>
-          <a:xfrm>
-            <a:off x="867032" y="3726161"/>
-            <a:ext cx="1430776" cy="276999"/>
+          <a:xfrm rot="16200000">
+            <a:off x="3574797" y="5976547"/>
+            <a:ext cx="986296" cy="276999"/>
           </a:xfrm>
           <a:prstGeom prst="rect">
             <a:avLst/>
@@ -3857,20 +3876,12 @@
           <a:lstStyle/>
           <a:p>
             <a:r>
-              <a:rPr lang="de-DE" sz="1200" dirty="0"/>
+              <a:rPr lang="de-DE" sz="1200" dirty="0" smtClean="0"/>
               <a:t>ADC </a:t>
             </a:r>
             <a:r>
-              <a:rPr lang="de-DE" sz="1200" dirty="0" err="1"/>
-              <a:t>Battery</a:t>
-            </a:r>
-            <a:r>
-              <a:rPr lang="de-DE" sz="1200" dirty="0"/>
-              <a:t> </a:t>
-            </a:r>
-            <a:r>
-              <a:rPr lang="de-DE" sz="1200" dirty="0" err="1"/>
-              <a:t>voltage</a:t>
+              <a:rPr lang="de-DE" sz="1200" dirty="0" err="1" smtClean="0"/>
+              <a:t>Throttle</a:t>
             </a:r>
             <a:endParaRPr lang="de-DE" sz="1200" dirty="0"/>
           </a:p>
@@ -3878,14 +3889,14 @@
       </p:sp>
       <p:sp>
         <p:nvSpPr>
-          <p:cNvPr id="28" name="Textfeld 27"/>
+          <p:cNvPr id="27" name="Textfeld 26"/>
           <p:cNvSpPr txBox="1"/>
           <p:nvPr/>
         </p:nvSpPr>
         <p:spPr>
-          <a:xfrm rot="16200000">
-            <a:off x="2521231" y="6415875"/>
-            <a:ext cx="2218300" cy="276999"/>
+          <a:xfrm>
+            <a:off x="827584" y="3726161"/>
+            <a:ext cx="1430776" cy="276999"/>
           </a:xfrm>
           <a:prstGeom prst="rect">
             <a:avLst/>
@@ -3899,51 +3910,35 @@
           <a:lstStyle/>
           <a:p>
             <a:r>
-              <a:rPr lang="de-DE" sz="1200" dirty="0"/>
+              <a:rPr lang="de-DE" sz="1200" dirty="0" smtClean="0"/>
               <a:t>ADC </a:t>
             </a:r>
             <a:r>
-              <a:rPr lang="de-DE" sz="1200" dirty="0" err="1"/>
+              <a:rPr lang="de-DE" sz="1200" dirty="0" err="1" smtClean="0"/>
               <a:t>Battery</a:t>
             </a:r>
             <a:r>
-              <a:rPr lang="de-DE" sz="1200" dirty="0"/>
+              <a:rPr lang="de-DE" sz="1200" dirty="0" smtClean="0"/>
               <a:t> </a:t>
             </a:r>
             <a:r>
-              <a:rPr lang="de-DE" sz="1200" dirty="0" err="1"/>
+              <a:rPr lang="de-DE" sz="1200" dirty="0" err="1" smtClean="0"/>
               <a:t>voltage</a:t>
             </a:r>
-            <a:r>
-              <a:rPr lang="de-DE" sz="1200" dirty="0"/>
-              <a:t> </a:t>
-            </a:r>
-            <a:r>
-              <a:rPr lang="de-DE" sz="1200" dirty="0" err="1"/>
-              <a:t>with</a:t>
-            </a:r>
-            <a:r>
-              <a:rPr lang="de-DE" sz="1200" dirty="0"/>
-              <a:t> </a:t>
-            </a:r>
-            <a:r>
-              <a:rPr lang="de-DE" sz="1200" dirty="0" err="1"/>
-              <a:t>offset</a:t>
-            </a:r>
             <a:endParaRPr lang="de-DE" sz="1200" dirty="0"/>
           </a:p>
         </p:txBody>
       </p:sp>
       <p:sp>
         <p:nvSpPr>
-          <p:cNvPr id="30" name="Textfeld 29"/>
+          <p:cNvPr id="28" name="Textfeld 27"/>
           <p:cNvSpPr txBox="1"/>
           <p:nvPr/>
         </p:nvSpPr>
         <p:spPr>
-          <a:xfrm>
-            <a:off x="1763751" y="1938604"/>
-            <a:ext cx="534057" cy="276999"/>
+          <a:xfrm rot="16200000">
+            <a:off x="2521231" y="6229657"/>
+            <a:ext cx="2218300" cy="276999"/>
           </a:xfrm>
           <a:prstGeom prst="rect">
             <a:avLst/>
@@ -3957,22 +3952,51 @@
           <a:lstStyle/>
           <a:p>
             <a:r>
-              <a:rPr lang="de-DE" sz="1200" dirty="0"/>
-              <a:t>Brake</a:t>
-            </a:r>
-          </a:p>
-        </p:txBody>
-      </p:sp>
-      <p:sp>
-        <p:nvSpPr>
-          <p:cNvPr id="31" name="Textfeld 30"/>
+              <a:rPr lang="de-DE" sz="1200" dirty="0" smtClean="0"/>
+              <a:t>ADC </a:t>
+            </a:r>
+            <a:r>
+              <a:rPr lang="de-DE" sz="1200" dirty="0" err="1" smtClean="0"/>
+              <a:t>Battery</a:t>
+            </a:r>
+            <a:r>
+              <a:rPr lang="de-DE" sz="1200" dirty="0" smtClean="0"/>
+              <a:t> </a:t>
+            </a:r>
+            <a:r>
+              <a:rPr lang="de-DE" sz="1200" dirty="0" err="1" smtClean="0"/>
+              <a:t>voltage</a:t>
+            </a:r>
+            <a:r>
+              <a:rPr lang="de-DE" sz="1200" dirty="0" smtClean="0"/>
+              <a:t> </a:t>
+            </a:r>
+            <a:r>
+              <a:rPr lang="de-DE" sz="1200" dirty="0" err="1" smtClean="0"/>
+              <a:t>with</a:t>
+            </a:r>
+            <a:r>
+              <a:rPr lang="de-DE" sz="1200" dirty="0" smtClean="0"/>
+              <a:t> </a:t>
+            </a:r>
+            <a:r>
+              <a:rPr lang="de-DE" sz="1200" dirty="0" err="1" smtClean="0"/>
+              <a:t>offset</a:t>
+            </a:r>
+            <a:endParaRPr lang="de-DE" sz="1200" dirty="0"/>
+          </a:p>
+        </p:txBody>
+      </p:sp>
+      <p:sp>
+        <p:nvSpPr>
+          <p:cNvPr id="30" name="Textfeld 29"/>
           <p:cNvSpPr txBox="1"/>
           <p:nvPr/>
         </p:nvSpPr>
         <p:spPr>
-          <a:xfrm rot="16200000">
-            <a:off x="5412728" y="608353"/>
-            <a:ext cx="899798" cy="276999"/>
+          <a:xfrm>
+            <a:off x="1690143" y="1938604"/>
+            <a:ext cx="534057" cy="276999"/>
           </a:xfrm>
           <a:prstGeom prst="rect">
             <a:avLst/>
@@ -3986,30 +4010,23 @@
           <a:lstStyle/>
           <a:p>
             <a:r>
-              <a:rPr lang="de-DE" sz="1200" dirty="0"/>
-              <a:t>PAS (</a:t>
-            </a:r>
-            <a:r>
-              <a:rPr lang="de-DE" sz="1200" dirty="0" err="1"/>
-              <a:t>green</a:t>
-            </a:r>
-            <a:r>
-              <a:rPr lang="de-DE" sz="1200" dirty="0"/>
-              <a:t>)</a:t>
-            </a:r>
-          </a:p>
-        </p:txBody>
-      </p:sp>
-      <p:sp>
-        <p:nvSpPr>
-          <p:cNvPr id="32" name="Textfeld 31"/>
+              <a:rPr lang="de-DE" sz="1200" dirty="0" smtClean="0"/>
+              <a:t>Brake</a:t>
+            </a:r>
+            <a:endParaRPr lang="de-DE" sz="1200" dirty="0"/>
+          </a:p>
+        </p:txBody>
+      </p:sp>
+      <p:sp>
+        <p:nvSpPr>
+          <p:cNvPr id="31" name="Textfeld 30"/>
           <p:cNvSpPr txBox="1"/>
           <p:nvPr/>
         </p:nvSpPr>
         <p:spPr>
-          <a:xfrm>
-            <a:off x="842217" y="4725144"/>
-            <a:ext cx="1455591" cy="276999"/>
+          <a:xfrm rot="16200000">
+            <a:off x="5352616" y="478109"/>
+            <a:ext cx="1020023" cy="276999"/>
           </a:xfrm>
           <a:prstGeom prst="rect">
             <a:avLst/>
@@ -4023,20 +4040,16 @@
           <a:lstStyle/>
           <a:p>
             <a:r>
-              <a:rPr lang="de-DE" sz="1200" dirty="0"/>
-              <a:t>ADC </a:t>
-            </a:r>
-            <a:r>
-              <a:rPr lang="de-DE" sz="1200" dirty="0" err="1"/>
-              <a:t>PhaseA</a:t>
-            </a:r>
-            <a:r>
-              <a:rPr lang="de-DE" sz="1200" dirty="0"/>
-              <a:t> </a:t>
-            </a:r>
-            <a:r>
-              <a:rPr lang="de-DE" sz="1200" dirty="0" err="1"/>
-              <a:t>Current</a:t>
+              <a:rPr lang="de-DE" sz="1200" dirty="0" smtClean="0"/>
+              <a:t>PAS (</a:t>
+            </a:r>
+            <a:r>
+              <a:rPr lang="de-DE" sz="1200" dirty="0" err="1" smtClean="0"/>
+              <a:t>green</a:t>
+            </a:r>
+            <a:r>
+              <a:rPr lang="de-DE" sz="1200" dirty="0" smtClean="0"/>
+              <a:t>?!)</a:t>
             </a:r>
             <a:endParaRPr lang="de-DE" sz="1200" dirty="0"/>
           </a:p>
@@ -4044,14 +4057,14 @@
       </p:sp>
       <p:sp>
         <p:nvSpPr>
-          <p:cNvPr id="33" name="Textfeld 32"/>
+          <p:cNvPr id="32" name="Textfeld 31"/>
           <p:cNvSpPr txBox="1"/>
           <p:nvPr/>
         </p:nvSpPr>
         <p:spPr>
-          <a:xfrm rot="16200000">
-            <a:off x="2268750" y="6089376"/>
-            <a:ext cx="1449179" cy="276999"/>
+          <a:xfrm>
+            <a:off x="746097" y="4725144"/>
+            <a:ext cx="1455591" cy="276999"/>
           </a:xfrm>
           <a:prstGeom prst="rect">
             <a:avLst/>
@@ -4065,19 +4078,19 @@
           <a:lstStyle/>
           <a:p>
             <a:r>
-              <a:rPr lang="de-DE" sz="1200" dirty="0"/>
+              <a:rPr lang="de-DE" sz="1200" dirty="0" smtClean="0"/>
               <a:t>ADC </a:t>
             </a:r>
             <a:r>
-              <a:rPr lang="de-DE" sz="1200" dirty="0" err="1"/>
-              <a:t>PhaseB</a:t>
-            </a:r>
-            <a:r>
-              <a:rPr lang="de-DE" sz="1200" dirty="0"/>
+              <a:rPr lang="de-DE" sz="1200" dirty="0" err="1" smtClean="0"/>
+              <a:t>PhaseA</a:t>
+            </a:r>
+            <a:r>
+              <a:rPr lang="de-DE" sz="1200" dirty="0" smtClean="0"/>
               <a:t> </a:t>
             </a:r>
             <a:r>
-              <a:rPr lang="de-DE" sz="1200" dirty="0" err="1"/>
+              <a:rPr lang="de-DE" sz="1200" dirty="0" err="1" smtClean="0"/>
               <a:t>Current</a:t>
             </a:r>
             <a:endParaRPr lang="de-DE" sz="1200" dirty="0"/>
@@ -4086,14 +4099,14 @@
       </p:sp>
       <p:sp>
         <p:nvSpPr>
-          <p:cNvPr id="34" name="Textfeld 33"/>
+          <p:cNvPr id="33" name="Textfeld 32"/>
           <p:cNvSpPr txBox="1"/>
           <p:nvPr/>
         </p:nvSpPr>
         <p:spPr>
           <a:xfrm rot="16200000">
-            <a:off x="3092232" y="6088574"/>
-            <a:ext cx="1447576" cy="276999"/>
+            <a:off x="2268750" y="6175331"/>
+            <a:ext cx="1449179" cy="276999"/>
           </a:xfrm>
           <a:prstGeom prst="rect">
             <a:avLst/>
@@ -4107,19 +4120,19 @@
           <a:lstStyle/>
           <a:p>
             <a:r>
-              <a:rPr lang="de-DE" sz="1200" dirty="0"/>
+              <a:rPr lang="de-DE" sz="1200" dirty="0" smtClean="0"/>
               <a:t>ADC </a:t>
             </a:r>
             <a:r>
-              <a:rPr lang="de-DE" sz="1200" dirty="0" err="1"/>
-              <a:t>PhaseC</a:t>
-            </a:r>
-            <a:r>
-              <a:rPr lang="de-DE" sz="1200" dirty="0"/>
+              <a:rPr lang="de-DE" sz="1200" dirty="0" err="1" smtClean="0"/>
+              <a:t>PhaseB</a:t>
+            </a:r>
+            <a:r>
+              <a:rPr lang="de-DE" sz="1200" dirty="0" smtClean="0"/>
               <a:t> </a:t>
             </a:r>
             <a:r>
-              <a:rPr lang="de-DE" sz="1200" dirty="0" err="1"/>
+              <a:rPr lang="de-DE" sz="1200" dirty="0" err="1" smtClean="0"/>
               <a:t>Current</a:t>
             </a:r>
             <a:endParaRPr lang="de-DE" sz="1200" dirty="0"/>
@@ -4128,14 +4141,14 @@
       </p:sp>
       <p:sp>
         <p:nvSpPr>
-          <p:cNvPr id="35" name="Textfeld 34"/>
+          <p:cNvPr id="34" name="Textfeld 33"/>
           <p:cNvSpPr txBox="1"/>
           <p:nvPr/>
         </p:nvSpPr>
         <p:spPr>
           <a:xfrm rot="16200000">
-            <a:off x="3219691" y="647563"/>
-            <a:ext cx="821379" cy="276999"/>
+            <a:off x="3092232" y="6157668"/>
+            <a:ext cx="1447576" cy="276999"/>
           </a:xfrm>
           <a:prstGeom prst="rect">
             <a:avLst/>
@@ -4149,158 +4162,22 @@
           <a:lstStyle/>
           <a:p>
             <a:r>
-              <a:rPr lang="de-DE" sz="1200" dirty="0"/>
-              <a:t>Encoder Z</a:t>
-            </a:r>
-          </a:p>
-        </p:txBody>
-      </p:sp>
-      <p:sp>
-        <p:nvSpPr>
-          <p:cNvPr id="36" name="Textfeld 35"/>
-          <p:cNvSpPr txBox="1"/>
-          <p:nvPr/>
-        </p:nvSpPr>
-        <p:spPr>
-          <a:xfrm>
-            <a:off x="1218345" y="4534797"/>
-            <a:ext cx="1079463" cy="276999"/>
-          </a:xfrm>
-          <a:prstGeom prst="rect">
-            <a:avLst/>
-          </a:prstGeom>
-          <a:noFill/>
-        </p:spPr>
-        <p:txBody>
-          <a:bodyPr wrap="none" rtlCol="0">
-            <a:spAutoFit/>
-          </a:bodyPr>
-          <a:lstStyle/>
-          <a:p>
-            <a:r>
-              <a:rPr lang="de-DE" sz="1200" dirty="0"/>
-              <a:t>Encoder PWM</a:t>
-            </a:r>
-          </a:p>
-        </p:txBody>
-      </p:sp>
-      <p:sp>
-        <p:nvSpPr>
-          <p:cNvPr id="2" name="Textfeld 1"/>
-          <p:cNvSpPr txBox="1"/>
-          <p:nvPr/>
-        </p:nvSpPr>
-        <p:spPr>
-          <a:xfrm>
-            <a:off x="299783" y="285688"/>
-            <a:ext cx="2858155" cy="369332"/>
-          </a:xfrm>
-          <a:prstGeom prst="rect">
-            <a:avLst/>
-          </a:prstGeom>
-          <a:noFill/>
-        </p:spPr>
-        <p:txBody>
-          <a:bodyPr wrap="none" rtlCol="0">
-            <a:spAutoFit/>
-          </a:bodyPr>
-          <a:lstStyle/>
-          <a:p>
-            <a:r>
-              <a:rPr lang="de-DE" dirty="0"/>
-              <a:t>M510 </a:t>
-            </a:r>
-            <a:r>
-              <a:rPr lang="de-DE" dirty="0" err="1"/>
-              <a:t>with</a:t>
-            </a:r>
-            <a:r>
-              <a:rPr lang="de-DE" dirty="0"/>
-              <a:t> MT6816 </a:t>
-            </a:r>
-            <a:r>
-              <a:rPr lang="de-DE" dirty="0" err="1"/>
-              <a:t>encoder</a:t>
-            </a:r>
-            <a:endParaRPr lang="de-DE" dirty="0"/>
-          </a:p>
-        </p:txBody>
-      </p:sp>
-      <p:sp>
-        <p:nvSpPr>
-          <p:cNvPr id="3" name="Textfeld 2">
-            <a:extLst>
-              <a:ext uri="{FF2B5EF4-FFF2-40B4-BE49-F238E27FC236}">
-                <a16:creationId xmlns:a16="http://schemas.microsoft.com/office/drawing/2014/main" id="{F2095C9F-8149-742B-E13D-66C65EFC45B7}"/>
-              </a:ext>
-            </a:extLst>
-          </p:cNvPr>
-          <p:cNvSpPr txBox="1"/>
-          <p:nvPr/>
-        </p:nvSpPr>
-        <p:spPr>
-          <a:xfrm rot="16200000">
-            <a:off x="5142252" y="554043"/>
-            <a:ext cx="1008418" cy="276999"/>
-          </a:xfrm>
-          <a:prstGeom prst="rect">
-            <a:avLst/>
-          </a:prstGeom>
-          <a:noFill/>
-        </p:spPr>
-        <p:txBody>
-          <a:bodyPr wrap="none" rtlCol="0">
-            <a:spAutoFit/>
-          </a:bodyPr>
-          <a:lstStyle/>
-          <a:p>
-            <a:r>
-              <a:rPr lang="de-DE" sz="1200" dirty="0"/>
-              <a:t>PAS 1 (</a:t>
-            </a:r>
-            <a:r>
-              <a:rPr lang="de-DE" sz="1200" dirty="0" err="1"/>
-              <a:t>white</a:t>
-            </a:r>
-            <a:r>
-              <a:rPr lang="de-DE" sz="1200" dirty="0"/>
-              <a:t>)</a:t>
-            </a:r>
-          </a:p>
-        </p:txBody>
-      </p:sp>
-      <p:sp>
-        <p:nvSpPr>
-          <p:cNvPr id="5" name="Textfeld 4">
-            <a:extLst>
-              <a:ext uri="{FF2B5EF4-FFF2-40B4-BE49-F238E27FC236}">
-                <a16:creationId xmlns:a16="http://schemas.microsoft.com/office/drawing/2014/main" id="{2D2236E2-1287-C621-3226-44180A6028BC}"/>
-              </a:ext>
-            </a:extLst>
-          </p:cNvPr>
-          <p:cNvSpPr txBox="1"/>
-          <p:nvPr/>
-        </p:nvSpPr>
-        <p:spPr>
-          <a:xfrm rot="16200000">
-            <a:off x="4969334" y="597293"/>
-            <a:ext cx="921919" cy="276999"/>
-          </a:xfrm>
-          <a:prstGeom prst="rect">
-            <a:avLst/>
-          </a:prstGeom>
-          <a:noFill/>
-        </p:spPr>
-        <p:txBody>
-          <a:bodyPr wrap="none" rtlCol="0">
-            <a:spAutoFit/>
-          </a:bodyPr>
-          <a:lstStyle/>
-          <a:p>
-            <a:r>
-              <a:rPr lang="de-DE" sz="1200" dirty="0"/>
-              <a:t>PAS 2 (pink)</a:t>
-            </a:r>
+              <a:rPr lang="de-DE" sz="1200" dirty="0" smtClean="0"/>
+              <a:t>ADC </a:t>
+            </a:r>
+            <a:r>
+              <a:rPr lang="de-DE" sz="1200" dirty="0" err="1" smtClean="0"/>
+              <a:t>PhaseC</a:t>
+            </a:r>
+            <a:r>
+              <a:rPr lang="de-DE" sz="1200" dirty="0" smtClean="0"/>
+              <a:t> </a:t>
+            </a:r>
+            <a:r>
+              <a:rPr lang="de-DE" sz="1200" dirty="0" err="1" smtClean="0"/>
+              <a:t>Current</a:t>
+            </a:r>
+            <a:endParaRPr lang="de-DE" sz="1200" dirty="0"/>
           </a:p>
         </p:txBody>
       </p:sp>
@@ -4308,301 +4185,6 @@
     <p:extLst>
       <p:ext uri="{BB962C8B-B14F-4D97-AF65-F5344CB8AC3E}">
         <p14:creationId xmlns:p14="http://schemas.microsoft.com/office/powerpoint/2010/main" val="3844898740"/>
-      </p:ext>
-    </p:extLst>
-  </p:cSld>
-  <p:clrMapOvr>
-    <a:masterClrMapping/>
-  </p:clrMapOvr>
-</p:sld>
-</file>
-
-<file path=ppt/slides/slide2.xml><?xml version="1.0" encoding="utf-8"?>
-<p:sld xmlns:a="http://schemas.openxmlformats.org/drawingml/2006/main" xmlns:r="http://schemas.openxmlformats.org/officeDocument/2006/relationships" xmlns:p="http://schemas.openxmlformats.org/presentationml/2006/main">
-  <p:cSld>
-    <p:spTree>
-      <p:nvGrpSpPr>
-        <p:cNvPr id="1" name=""/>
-        <p:cNvGrpSpPr/>
-        <p:nvPr/>
-      </p:nvGrpSpPr>
-      <p:grpSpPr>
-        <a:xfrm>
-          <a:off x="0" y="0"/>
-          <a:ext cx="0" cy="0"/>
-          <a:chOff x="0" y="0"/>
-          <a:chExt cx="0" cy="0"/>
-        </a:xfrm>
-      </p:grpSpPr>
-      <p:pic>
-        <p:nvPicPr>
-          <p:cNvPr id="3" name="Grafik 2" descr="Ein Bild, das Elektronik, Schaltung, Elektronisches Bauteil, Elektrisches Bauelement enthält.&#10;&#10;KI-generierte Inhalte können fehlerhaft sein.">
-            <a:extLst>
-              <a:ext uri="{FF2B5EF4-FFF2-40B4-BE49-F238E27FC236}">
-                <a16:creationId xmlns:a16="http://schemas.microsoft.com/office/drawing/2014/main" id="{322A2215-9EE0-B33C-BB8C-E33377D10CCB}"/>
-              </a:ext>
-            </a:extLst>
-          </p:cNvPr>
-          <p:cNvPicPr>
-            <a:picLocks noChangeAspect="1"/>
-          </p:cNvPicPr>
-          <p:nvPr/>
-        </p:nvPicPr>
-        <p:blipFill>
-          <a:blip r:embed="rId2">
-            <a:extLst>
-              <a:ext uri="{28A0092B-C50C-407E-A947-70E740481C1C}">
-                <a14:useLocalDpi xmlns:a14="http://schemas.microsoft.com/office/drawing/2010/main" val="0"/>
-              </a:ext>
-            </a:extLst>
-          </a:blip>
-          <a:srcRect b="53333"/>
-          <a:stretch>
-            <a:fillRect/>
-          </a:stretch>
-        </p:blipFill>
-        <p:spPr>
-          <a:xfrm>
-            <a:off x="1979712" y="2468393"/>
-            <a:ext cx="4454140" cy="1512168"/>
-          </a:xfrm>
-          <a:prstGeom prst="rect">
-            <a:avLst/>
-          </a:prstGeom>
-        </p:spPr>
-      </p:pic>
-      <p:sp>
-        <p:nvSpPr>
-          <p:cNvPr id="4" name="Textfeld 3">
-            <a:extLst>
-              <a:ext uri="{FF2B5EF4-FFF2-40B4-BE49-F238E27FC236}">
-                <a16:creationId xmlns:a16="http://schemas.microsoft.com/office/drawing/2014/main" id="{43FC932C-2F43-4156-B5AD-621B4A5B482E}"/>
-              </a:ext>
-            </a:extLst>
-          </p:cNvPr>
-          <p:cNvSpPr txBox="1"/>
-          <p:nvPr/>
-        </p:nvSpPr>
-        <p:spPr>
-          <a:xfrm rot="16200000">
-            <a:off x="4277410" y="1316550"/>
-            <a:ext cx="2018309" cy="338554"/>
-          </a:xfrm>
-          <a:prstGeom prst="rect">
-            <a:avLst/>
-          </a:prstGeom>
-          <a:noFill/>
-        </p:spPr>
-        <p:txBody>
-          <a:bodyPr wrap="none" rtlCol="0">
-            <a:spAutoFit/>
-          </a:bodyPr>
-          <a:lstStyle/>
-          <a:p>
-            <a:r>
-              <a:rPr lang="de-DE" sz="1600" dirty="0"/>
-              <a:t> PA15 </a:t>
-            </a:r>
-            <a:r>
-              <a:rPr lang="de-DE" sz="1600" dirty="0" err="1"/>
-              <a:t>speed</a:t>
-            </a:r>
-            <a:r>
-              <a:rPr lang="de-DE" sz="1600" dirty="0"/>
-              <a:t>/</a:t>
-            </a:r>
-            <a:r>
-              <a:rPr lang="de-DE" sz="1600" dirty="0" err="1"/>
-              <a:t>direction</a:t>
-            </a:r>
-            <a:endParaRPr lang="de-DE" sz="1600" dirty="0"/>
-          </a:p>
-        </p:txBody>
-      </p:sp>
-      <p:sp>
-        <p:nvSpPr>
-          <p:cNvPr id="5" name="Textfeld 4">
-            <a:extLst>
-              <a:ext uri="{FF2B5EF4-FFF2-40B4-BE49-F238E27FC236}">
-                <a16:creationId xmlns:a16="http://schemas.microsoft.com/office/drawing/2014/main" id="{C349B60E-8787-B373-0106-7FA7336EF7D6}"/>
-              </a:ext>
-            </a:extLst>
-          </p:cNvPr>
-          <p:cNvSpPr txBox="1"/>
-          <p:nvPr/>
-        </p:nvSpPr>
-        <p:spPr>
-          <a:xfrm rot="16200000">
-            <a:off x="4363585" y="1772059"/>
-            <a:ext cx="1107291" cy="338554"/>
-          </a:xfrm>
-          <a:prstGeom prst="rect">
-            <a:avLst/>
-          </a:prstGeom>
-          <a:noFill/>
-        </p:spPr>
-        <p:txBody>
-          <a:bodyPr wrap="none" rtlCol="0">
-            <a:spAutoFit/>
-          </a:bodyPr>
-          <a:lstStyle/>
-          <a:p>
-            <a:r>
-              <a:rPr lang="de-DE" sz="1600" dirty="0"/>
-              <a:t>PA7 </a:t>
-            </a:r>
-            <a:r>
-              <a:rPr lang="de-DE" sz="1600" dirty="0" err="1"/>
-              <a:t>torque</a:t>
-            </a:r>
-            <a:endParaRPr lang="de-DE" sz="1600" dirty="0"/>
-          </a:p>
-        </p:txBody>
-      </p:sp>
-      <p:sp>
-        <p:nvSpPr>
-          <p:cNvPr id="6" name="Textfeld 5">
-            <a:extLst>
-              <a:ext uri="{FF2B5EF4-FFF2-40B4-BE49-F238E27FC236}">
-                <a16:creationId xmlns:a16="http://schemas.microsoft.com/office/drawing/2014/main" id="{78F5FDE1-DDF2-0D0C-5F66-9A710594616F}"/>
-              </a:ext>
-            </a:extLst>
-          </p:cNvPr>
-          <p:cNvSpPr txBox="1"/>
-          <p:nvPr/>
-        </p:nvSpPr>
-        <p:spPr>
-          <a:xfrm rot="16200000">
-            <a:off x="4175653" y="2038607"/>
-            <a:ext cx="574196" cy="338554"/>
-          </a:xfrm>
-          <a:prstGeom prst="rect">
-            <a:avLst/>
-          </a:prstGeom>
-          <a:noFill/>
-        </p:spPr>
-        <p:txBody>
-          <a:bodyPr wrap="none" rtlCol="0">
-            <a:spAutoFit/>
-          </a:bodyPr>
-          <a:lstStyle/>
-          <a:p>
-            <a:r>
-              <a:rPr lang="de-DE" sz="1600" dirty="0"/>
-              <a:t>GND</a:t>
-            </a:r>
-          </a:p>
-        </p:txBody>
-      </p:sp>
-      <p:sp>
-        <p:nvSpPr>
-          <p:cNvPr id="7" name="Textfeld 6">
-            <a:extLst>
-              <a:ext uri="{FF2B5EF4-FFF2-40B4-BE49-F238E27FC236}">
-                <a16:creationId xmlns:a16="http://schemas.microsoft.com/office/drawing/2014/main" id="{E8195A63-B7A3-AAF6-B2DB-65AC9328DF02}"/>
-              </a:ext>
-            </a:extLst>
-          </p:cNvPr>
-          <p:cNvSpPr txBox="1"/>
-          <p:nvPr/>
-        </p:nvSpPr>
-        <p:spPr>
-          <a:xfrm rot="16200000">
-            <a:off x="4179265" y="4090024"/>
-            <a:ext cx="508473" cy="338554"/>
-          </a:xfrm>
-          <a:prstGeom prst="rect">
-            <a:avLst/>
-          </a:prstGeom>
-          <a:noFill/>
-        </p:spPr>
-        <p:txBody>
-          <a:bodyPr wrap="none" rtlCol="0">
-            <a:spAutoFit/>
-          </a:bodyPr>
-          <a:lstStyle/>
-          <a:p>
-            <a:r>
-              <a:rPr lang="de-DE" sz="1600" dirty="0"/>
-              <a:t>+5V</a:t>
-            </a:r>
-          </a:p>
-        </p:txBody>
-      </p:sp>
-      <p:sp>
-        <p:nvSpPr>
-          <p:cNvPr id="8" name="Textfeld 7">
-            <a:extLst>
-              <a:ext uri="{FF2B5EF4-FFF2-40B4-BE49-F238E27FC236}">
-                <a16:creationId xmlns:a16="http://schemas.microsoft.com/office/drawing/2014/main" id="{72A4487F-D233-5CF6-2043-147E5F1C1C87}"/>
-              </a:ext>
-            </a:extLst>
-          </p:cNvPr>
-          <p:cNvSpPr txBox="1"/>
-          <p:nvPr/>
-        </p:nvSpPr>
-        <p:spPr>
-          <a:xfrm rot="16200000">
-            <a:off x="4379563" y="4366991"/>
-            <a:ext cx="1062407" cy="338554"/>
-          </a:xfrm>
-          <a:prstGeom prst="rect">
-            <a:avLst/>
-          </a:prstGeom>
-          <a:noFill/>
-        </p:spPr>
-        <p:txBody>
-          <a:bodyPr wrap="none" rtlCol="0">
-            <a:spAutoFit/>
-          </a:bodyPr>
-          <a:lstStyle/>
-          <a:p>
-            <a:r>
-              <a:rPr lang="de-DE" sz="1600" dirty="0"/>
-              <a:t>PC10 PAS1</a:t>
-            </a:r>
-          </a:p>
-        </p:txBody>
-      </p:sp>
-      <p:sp>
-        <p:nvSpPr>
-          <p:cNvPr id="9" name="Textfeld 8">
-            <a:extLst>
-              <a:ext uri="{FF2B5EF4-FFF2-40B4-BE49-F238E27FC236}">
-                <a16:creationId xmlns:a16="http://schemas.microsoft.com/office/drawing/2014/main" id="{CD9454DA-A868-5CD3-83B2-F6BFEBAFAC3A}"/>
-              </a:ext>
-            </a:extLst>
-          </p:cNvPr>
-          <p:cNvSpPr txBox="1"/>
-          <p:nvPr/>
-        </p:nvSpPr>
-        <p:spPr>
-          <a:xfrm rot="16200000">
-            <a:off x="4706660" y="4366991"/>
-            <a:ext cx="1062407" cy="338554"/>
-          </a:xfrm>
-          <a:prstGeom prst="rect">
-            <a:avLst/>
-          </a:prstGeom>
-          <a:noFill/>
-        </p:spPr>
-        <p:txBody>
-          <a:bodyPr wrap="none" rtlCol="0">
-            <a:spAutoFit/>
-          </a:bodyPr>
-          <a:lstStyle/>
-          <a:p>
-            <a:r>
-              <a:rPr lang="de-DE" sz="1600" dirty="0"/>
-              <a:t>PC11 PAS2</a:t>
-            </a:r>
-          </a:p>
-        </p:txBody>
-      </p:sp>
-    </p:spTree>
-    <p:extLst>
-      <p:ext uri="{BB962C8B-B14F-4D97-AF65-F5344CB8AC3E}">
-        <p14:creationId xmlns:p14="http://schemas.microsoft.com/office/powerpoint/2010/main" val="2592692295"/>
       </p:ext>
     </p:extLst>
   </p:cSld>

</xml_diff>